<commit_message>
Adds new consolidated review results
</commit_message>
<xml_diff>
--- a/Figures.pptx
+++ b/Figures.pptx
@@ -5,11 +5,22 @@
     <p:sldMasterId id="2147483648" r:id="rId1"/>
   </p:sldMasterIdLst>
   <p:sldIdLst>
-    <p:sldId id="258" r:id="rId2"/>
-    <p:sldId id="259" r:id="rId3"/>
-    <p:sldId id="260" r:id="rId4"/>
-    <p:sldId id="261" r:id="rId5"/>
-    <p:sldId id="262" r:id="rId6"/>
+    <p:sldId id="272" r:id="rId2"/>
+    <p:sldId id="258" r:id="rId3"/>
+    <p:sldId id="259" r:id="rId4"/>
+    <p:sldId id="260" r:id="rId5"/>
+    <p:sldId id="261" r:id="rId6"/>
+    <p:sldId id="273" r:id="rId7"/>
+    <p:sldId id="277" r:id="rId8"/>
+    <p:sldId id="276" r:id="rId9"/>
+    <p:sldId id="275" r:id="rId10"/>
+    <p:sldId id="274" r:id="rId11"/>
+    <p:sldId id="262" r:id="rId12"/>
+    <p:sldId id="263" r:id="rId13"/>
+    <p:sldId id="264" r:id="rId14"/>
+    <p:sldId id="265" r:id="rId15"/>
+    <p:sldId id="266" r:id="rId16"/>
+    <p:sldId id="267" r:id="rId17"/>
   </p:sldIdLst>
   <p:sldSz cx="12192000" cy="6858000"/>
   <p:notesSz cx="6858000" cy="9144000"/>
@@ -108,6 +119,11 @@
       </a:defRPr>
     </a:lvl9pPr>
   </p:defaultTextStyle>
+  <p:extLst>
+    <p:ext uri="{EFAFB233-063F-42B5-8137-9DF3F51BA10A}">
+      <p15:sldGuideLst xmlns:p15="http://schemas.microsoft.com/office/powerpoint/2012/main"/>
+    </p:ext>
+  </p:extLst>
 </p:presentation>
 </file>
 
@@ -258,7 +274,7 @@
           <a:p>
             <a:fld id="{19B2ED95-070F-3142-8B9E-B25E467B2EFD}" type="datetimeFigureOut">
               <a:rPr lang="en-US" smtClean="0"/>
-              <a:t>4/28/22</a:t>
+              <a:t>4/29/22</a:t>
             </a:fld>
             <a:endParaRPr lang="en-US"/>
           </a:p>
@@ -456,7 +472,7 @@
           <a:p>
             <a:fld id="{19B2ED95-070F-3142-8B9E-B25E467B2EFD}" type="datetimeFigureOut">
               <a:rPr lang="en-US" smtClean="0"/>
-              <a:t>4/28/22</a:t>
+              <a:t>4/29/22</a:t>
             </a:fld>
             <a:endParaRPr lang="en-US"/>
           </a:p>
@@ -664,7 +680,7 @@
           <a:p>
             <a:fld id="{19B2ED95-070F-3142-8B9E-B25E467B2EFD}" type="datetimeFigureOut">
               <a:rPr lang="en-US" smtClean="0"/>
-              <a:t>4/28/22</a:t>
+              <a:t>4/29/22</a:t>
             </a:fld>
             <a:endParaRPr lang="en-US"/>
           </a:p>
@@ -862,7 +878,7 @@
           <a:p>
             <a:fld id="{19B2ED95-070F-3142-8B9E-B25E467B2EFD}" type="datetimeFigureOut">
               <a:rPr lang="en-US" smtClean="0"/>
-              <a:t>4/28/22</a:t>
+              <a:t>4/29/22</a:t>
             </a:fld>
             <a:endParaRPr lang="en-US"/>
           </a:p>
@@ -1137,7 +1153,7 @@
           <a:p>
             <a:fld id="{19B2ED95-070F-3142-8B9E-B25E467B2EFD}" type="datetimeFigureOut">
               <a:rPr lang="en-US" smtClean="0"/>
-              <a:t>4/28/22</a:t>
+              <a:t>4/29/22</a:t>
             </a:fld>
             <a:endParaRPr lang="en-US"/>
           </a:p>
@@ -1402,7 +1418,7 @@
           <a:p>
             <a:fld id="{19B2ED95-070F-3142-8B9E-B25E467B2EFD}" type="datetimeFigureOut">
               <a:rPr lang="en-US" smtClean="0"/>
-              <a:t>4/28/22</a:t>
+              <a:t>4/29/22</a:t>
             </a:fld>
             <a:endParaRPr lang="en-US"/>
           </a:p>
@@ -1814,7 +1830,7 @@
           <a:p>
             <a:fld id="{19B2ED95-070F-3142-8B9E-B25E467B2EFD}" type="datetimeFigureOut">
               <a:rPr lang="en-US" smtClean="0"/>
-              <a:t>4/28/22</a:t>
+              <a:t>4/29/22</a:t>
             </a:fld>
             <a:endParaRPr lang="en-US"/>
           </a:p>
@@ -1955,7 +1971,7 @@
           <a:p>
             <a:fld id="{19B2ED95-070F-3142-8B9E-B25E467B2EFD}" type="datetimeFigureOut">
               <a:rPr lang="en-US" smtClean="0"/>
-              <a:t>4/28/22</a:t>
+              <a:t>4/29/22</a:t>
             </a:fld>
             <a:endParaRPr lang="en-US"/>
           </a:p>
@@ -2068,7 +2084,7 @@
           <a:p>
             <a:fld id="{19B2ED95-070F-3142-8B9E-B25E467B2EFD}" type="datetimeFigureOut">
               <a:rPr lang="en-US" smtClean="0"/>
-              <a:t>4/28/22</a:t>
+              <a:t>4/29/22</a:t>
             </a:fld>
             <a:endParaRPr lang="en-US"/>
           </a:p>
@@ -2379,7 +2395,7 @@
           <a:p>
             <a:fld id="{19B2ED95-070F-3142-8B9E-B25E467B2EFD}" type="datetimeFigureOut">
               <a:rPr lang="en-US" smtClean="0"/>
-              <a:t>4/28/22</a:t>
+              <a:t>4/29/22</a:t>
             </a:fld>
             <a:endParaRPr lang="en-US"/>
           </a:p>
@@ -2667,7 +2683,7 @@
           <a:p>
             <a:fld id="{19B2ED95-070F-3142-8B9E-B25E467B2EFD}" type="datetimeFigureOut">
               <a:rPr lang="en-US" smtClean="0"/>
-              <a:t>4/28/22</a:t>
+              <a:t>4/29/22</a:t>
             </a:fld>
             <a:endParaRPr lang="en-US"/>
           </a:p>
@@ -2908,7 +2924,7 @@
           <a:p>
             <a:fld id="{19B2ED95-070F-3142-8B9E-B25E467B2EFD}" type="datetimeFigureOut">
               <a:rPr lang="en-US" smtClean="0"/>
-              <a:t>4/28/22</a:t>
+              <a:t>4/29/22</a:t>
             </a:fld>
             <a:endParaRPr lang="en-US"/>
           </a:p>
@@ -3330,7 +3346,7 @@
           <p:cNvPr id="2" name="Title 1">
             <a:extLst>
               <a:ext uri="{FF2B5EF4-FFF2-40B4-BE49-F238E27FC236}">
-                <a16:creationId xmlns:a16="http://schemas.microsoft.com/office/drawing/2014/main" id="{6D804DAD-F4D2-EB48-9443-47E91A94D708}"/>
+                <a16:creationId xmlns:a16="http://schemas.microsoft.com/office/drawing/2014/main" id="{DB0C6CD3-7EBA-E7B5-8CB6-3D2E2F53AEFB}"/>
               </a:ext>
             </a:extLst>
           </p:cNvPr>
@@ -3343,104 +3359,18 @@
         </p:nvSpPr>
         <p:spPr>
           <a:xfrm>
-            <a:off x="838200" y="0"/>
-            <a:ext cx="10515600" cy="6241009"/>
+            <a:off x="838200" y="2766218"/>
+            <a:ext cx="10515600" cy="1325563"/>
           </a:xfrm>
         </p:spPr>
         <p:txBody>
-          <a:bodyPr>
-            <a:noAutofit/>
-          </a:bodyPr>
-          <a:lstStyle/>
-          <a:p>
-            <a:r>
-              <a:rPr lang="en-US" sz="1200" dirty="0"/>
-              <a:t>("Mathematical Concepts"[Mesh] OR "Operations Research"[Mesh] OR "operations research" OR "operational research")</a:t>
-            </a:r>
-            <a:br>
-              <a:rPr lang="en-US" sz="1200" dirty="0"/>
-            </a:br>
-            <a:r>
-              <a:rPr lang="en-US" sz="1200" dirty="0"/>
-              <a:t>AND</a:t>
-            </a:r>
-            <a:br>
-              <a:rPr lang="en-US" sz="1200" dirty="0"/>
-            </a:br>
-            <a:r>
-              <a:rPr lang="en-US" sz="1200" dirty="0"/>
-              <a:t>("Radiotherapy"[Mesh] OR "radiotherapy" OR "radiation therapy")</a:t>
-            </a:r>
-            <a:br>
-              <a:rPr lang="en-US" sz="1200" dirty="0"/>
-            </a:br>
-            <a:r>
-              <a:rPr lang="en-US" sz="1200" dirty="0"/>
-              <a:t>AND</a:t>
-            </a:r>
-            <a:br>
-              <a:rPr lang="en-US" sz="1200" dirty="0"/>
-            </a:br>
-            <a:r>
-              <a:rPr lang="en-US" sz="1200" dirty="0"/>
-              <a:t>("Clinical Decision-Making"[Mesh] OR "Decision Support Techniques"[Mesh] OR "Decision Support Systems, Clinical"[Mesh] OR</a:t>
-            </a:r>
-            <a:br>
-              <a:rPr lang="en-US" sz="1200" dirty="0"/>
-            </a:br>
-            <a:r>
-              <a:rPr lang="en-US" sz="1200" dirty="0"/>
-              <a:t>"Decision Making"[Mesh] OR "Decision Theory"[Mesh] OR "Clinical Decision Rules"[Mesh] OR "Decision Trees"[Mesh] OR</a:t>
-            </a:r>
-            <a:br>
-              <a:rPr lang="en-US" sz="1200" dirty="0"/>
-            </a:br>
-            <a:r>
-              <a:rPr lang="en-US" sz="1200" dirty="0"/>
-              <a:t>"decision")</a:t>
-            </a:r>
-            <a:br>
-              <a:rPr lang="en-US" sz="1200" dirty="0"/>
-            </a:br>
-            <a:br>
-              <a:rPr lang="en-US" sz="1200" dirty="0"/>
-            </a:br>
-            <a:endParaRPr lang="en-US" sz="1200" dirty="0"/>
-          </a:p>
-        </p:txBody>
-      </p:sp>
-      <p:sp>
-        <p:nvSpPr>
-          <p:cNvPr id="3" name="Content Placeholder 2">
-            <a:extLst>
-              <a:ext uri="{FF2B5EF4-FFF2-40B4-BE49-F238E27FC236}">
-                <a16:creationId xmlns:a16="http://schemas.microsoft.com/office/drawing/2014/main" id="{43BB1DA0-5C2C-3D42-9701-B21381A6ECC9}"/>
-              </a:ext>
-            </a:extLst>
-          </p:cNvPr>
-          <p:cNvSpPr>
-            <a:spLocks noGrp="1"/>
-          </p:cNvSpPr>
-          <p:nvPr>
-            <p:ph idx="1"/>
-          </p:nvPr>
-        </p:nvSpPr>
-        <p:spPr>
-          <a:xfrm>
-            <a:off x="838200" y="6241009"/>
-            <a:ext cx="10515600" cy="616991"/>
-          </a:xfrm>
-        </p:spPr>
-        <p:txBody>
           <a:bodyPr/>
           <a:lstStyle/>
           <a:p>
-            <a:pPr marL="0" indent="0" algn="ctr">
-              <a:buNone/>
-            </a:pPr>
+            <a:pPr algn="ctr"/>
             <a:r>
               <a:rPr lang="en-US" dirty="0"/>
-              <a:t>N = 2,225</a:t>
+              <a:t>Old Queries</a:t>
             </a:r>
           </a:p>
         </p:txBody>
@@ -3448,7 +3378,7 @@
     </p:spTree>
     <p:extLst>
       <p:ext uri="{BB962C8B-B14F-4D97-AF65-F5344CB8AC3E}">
-        <p14:creationId xmlns:p14="http://schemas.microsoft.com/office/powerpoint/2010/main" val="1861579595"/>
+        <p14:creationId xmlns:p14="http://schemas.microsoft.com/office/powerpoint/2010/main" val="1560764161"/>
       </p:ext>
     </p:extLst>
   </p:cSld>
@@ -3458,7 +3388,7 @@
 </p:sld>
 </file>
 
-<file path=ppt/slides/slide2.xml><?xml version="1.0" encoding="utf-8"?>
+<file path=ppt/slides/slide10.xml><?xml version="1.0" encoding="utf-8"?>
 <p:sld xmlns:a="http://schemas.openxmlformats.org/drawingml/2006/main" xmlns:r="http://schemas.openxmlformats.org/officeDocument/2006/relationships" xmlns:p="http://schemas.openxmlformats.org/presentationml/2006/main">
   <p:cSld>
     <p:spTree>
@@ -3505,7 +3435,7 @@
           <a:p>
             <a:r>
               <a:rPr lang="en-US" sz="1200" dirty="0"/>
-              <a:t>("Mathematical Concepts"[Mesh] OR "Operations Research"[Mesh] OR "operations research" OR "operational research")</a:t>
+              <a:t>("Stochastic Processes"[Mesh] OR "Operations Research"[Mesh] OR "operations research" OR "operational research" OR "Markov Model" OR "Markov models" OR "Markov chain" OR "Markov chains")</a:t>
             </a:r>
             <a:br>
               <a:rPr lang="en-US" sz="1200" dirty="0"/>
@@ -3737,6 +3667,28 @@
             <a:r>
               <a:rPr lang="en-US" sz="1200" dirty="0"/>
               <a:t>NOT "Uncertainty"[Mesh]</a:t>
+            </a:r>
+            <a:br>
+              <a:rPr lang="en-US" sz="1200" dirty="0"/>
+            </a:br>
+            <a:r>
+              <a:rPr lang="en-US" sz="1200" dirty="0"/>
+              <a:t>AND "English" [LA]</a:t>
+            </a:r>
+            <a:br>
+              <a:rPr lang="en-US" sz="1200" dirty="0"/>
+            </a:br>
+            <a:r>
+              <a:rPr lang="en-US" sz="1200" dirty="0"/>
+              <a:t>AND 2000:2022[</a:t>
+            </a:r>
+            <a:r>
+              <a:rPr lang="en-US" sz="1200" dirty="0" err="1"/>
+              <a:t>dp</a:t>
+            </a:r>
+            <a:r>
+              <a:rPr lang="en-US" sz="1200" dirty="0"/>
+              <a:t>]</a:t>
             </a:r>
           </a:p>
         </p:txBody>
@@ -3772,7 +3724,7 @@
             </a:pPr>
             <a:r>
               <a:rPr lang="en-US" dirty="0"/>
-              <a:t>N = 287</a:t>
+              <a:t>N = 54</a:t>
             </a:r>
           </a:p>
         </p:txBody>
@@ -3780,7 +3732,7 @@
     </p:spTree>
     <p:extLst>
       <p:ext uri="{BB962C8B-B14F-4D97-AF65-F5344CB8AC3E}">
-        <p14:creationId xmlns:p14="http://schemas.microsoft.com/office/powerpoint/2010/main" val="1777122621"/>
+        <p14:creationId xmlns:p14="http://schemas.microsoft.com/office/powerpoint/2010/main" val="2554502006"/>
       </p:ext>
     </p:extLst>
   </p:cSld>
@@ -3790,700 +3742,7 @@
 </p:sld>
 </file>
 
-<file path=ppt/slides/slide3.xml><?xml version="1.0" encoding="utf-8"?>
-<p:sld xmlns:a="http://schemas.openxmlformats.org/drawingml/2006/main" xmlns:r="http://schemas.openxmlformats.org/officeDocument/2006/relationships" xmlns:p="http://schemas.openxmlformats.org/presentationml/2006/main">
-  <p:cSld>
-    <p:spTree>
-      <p:nvGrpSpPr>
-        <p:cNvPr id="1" name=""/>
-        <p:cNvGrpSpPr/>
-        <p:nvPr/>
-      </p:nvGrpSpPr>
-      <p:grpSpPr>
-        <a:xfrm>
-          <a:off x="0" y="0"/>
-          <a:ext cx="0" cy="0"/>
-          <a:chOff x="0" y="0"/>
-          <a:chExt cx="0" cy="0"/>
-        </a:xfrm>
-      </p:grpSpPr>
-      <p:sp>
-        <p:nvSpPr>
-          <p:cNvPr id="2" name="Title 1">
-            <a:extLst>
-              <a:ext uri="{FF2B5EF4-FFF2-40B4-BE49-F238E27FC236}">
-                <a16:creationId xmlns:a16="http://schemas.microsoft.com/office/drawing/2014/main" id="{6D804DAD-F4D2-EB48-9443-47E91A94D708}"/>
-              </a:ext>
-            </a:extLst>
-          </p:cNvPr>
-          <p:cNvSpPr>
-            <a:spLocks noGrp="1"/>
-          </p:cNvSpPr>
-          <p:nvPr>
-            <p:ph type="title"/>
-          </p:nvPr>
-        </p:nvSpPr>
-        <p:spPr>
-          <a:xfrm>
-            <a:off x="838200" y="0"/>
-            <a:ext cx="10515600" cy="6241009"/>
-          </a:xfrm>
-        </p:spPr>
-        <p:txBody>
-          <a:bodyPr>
-            <a:noAutofit/>
-          </a:bodyPr>
-          <a:lstStyle/>
-          <a:p>
-            <a:r>
-              <a:rPr lang="en-US" sz="1200" dirty="0"/>
-              <a:t>("Mathematical Concepts"[Mesh] OR "Operations Research"[Mesh] OR "operations research" OR "operational research")</a:t>
-            </a:r>
-            <a:br>
-              <a:rPr lang="en-US" sz="1200" dirty="0"/>
-            </a:br>
-            <a:r>
-              <a:rPr lang="en-US" sz="1200" dirty="0"/>
-              <a:t>AND</a:t>
-            </a:r>
-            <a:br>
-              <a:rPr lang="en-US" sz="1200" dirty="0"/>
-            </a:br>
-            <a:r>
-              <a:rPr lang="en-US" sz="1200" dirty="0"/>
-              <a:t>("Radiotherapy"[Mesh] OR "radiotherapy" OR "radiation therapy")</a:t>
-            </a:r>
-            <a:br>
-              <a:rPr lang="en-US" sz="1200" dirty="0"/>
-            </a:br>
-            <a:r>
-              <a:rPr lang="en-US" sz="1200" dirty="0"/>
-              <a:t>AND</a:t>
-            </a:r>
-            <a:br>
-              <a:rPr lang="en-US" sz="1200" dirty="0"/>
-            </a:br>
-            <a:r>
-              <a:rPr lang="en-US" sz="1200" dirty="0"/>
-              <a:t>("Clinical Decision-Making"[Mesh] OR "Decision Support Techniques"[Mesh] OR "Decision Support Systems, Clinical"[Mesh] OR</a:t>
-            </a:r>
-            <a:br>
-              <a:rPr lang="en-US" sz="1200" dirty="0"/>
-            </a:br>
-            <a:r>
-              <a:rPr lang="en-US" sz="1200" dirty="0"/>
-              <a:t>"Decision Making"[Mesh] OR "Decision Theory"[Mesh] OR "Clinical Decision Rules"[Mesh] OR "Decision Trees"[Mesh] OR</a:t>
-            </a:r>
-            <a:br>
-              <a:rPr lang="en-US" sz="1200" dirty="0"/>
-            </a:br>
-            <a:r>
-              <a:rPr lang="en-US" sz="1200" dirty="0"/>
-              <a:t>"decision")</a:t>
-            </a:r>
-            <a:br>
-              <a:rPr lang="en-US" sz="1200" dirty="0"/>
-            </a:br>
-            <a:r>
-              <a:rPr lang="en-US" sz="1200" dirty="0"/>
-              <a:t>NOT "Anisotropy"[Mesh]</a:t>
-            </a:r>
-            <a:br>
-              <a:rPr lang="en-US" sz="1200" dirty="0"/>
-            </a:br>
-            <a:r>
-              <a:rPr lang="en-US" sz="1200" dirty="0"/>
-              <a:t>NOT "Artificial Intelligence"[Mesh]</a:t>
-            </a:r>
-            <a:br>
-              <a:rPr lang="en-US" sz="1200" dirty="0"/>
-            </a:br>
-            <a:r>
-              <a:rPr lang="en-US" sz="1200" dirty="0"/>
-              <a:t>NOT "Bionics"[Mesh]</a:t>
-            </a:r>
-            <a:br>
-              <a:rPr lang="en-US" sz="1200" dirty="0"/>
-            </a:br>
-            <a:r>
-              <a:rPr lang="en-US" sz="1200" dirty="0"/>
-              <a:t>NOT "Cells, Cultured"[Mesh]</a:t>
-            </a:r>
-            <a:br>
-              <a:rPr lang="en-US" sz="1200" dirty="0"/>
-            </a:br>
-            <a:r>
-              <a:rPr lang="en-US" sz="1200" dirty="0"/>
-              <a:t>NOT "Clinical Trial"[Publication Type]</a:t>
-            </a:r>
-            <a:br>
-              <a:rPr lang="en-US" sz="1200" dirty="0"/>
-            </a:br>
-            <a:r>
-              <a:rPr lang="en-US" sz="1200" dirty="0"/>
-              <a:t>NOT "Cryopreservation"[Mesh]</a:t>
-            </a:r>
-            <a:br>
-              <a:rPr lang="en-US" sz="1200" dirty="0"/>
-            </a:br>
-            <a:r>
-              <a:rPr lang="en-US" sz="1200" dirty="0"/>
-              <a:t>NOT "Diagnosis, Differential"[Mesh]</a:t>
-            </a:r>
-            <a:br>
-              <a:rPr lang="en-US" sz="1200" dirty="0"/>
-            </a:br>
-            <a:r>
-              <a:rPr lang="en-US" sz="1200" dirty="0"/>
-              <a:t>NOT "Disaster Planning"[Mesh]</a:t>
-            </a:r>
-            <a:br>
-              <a:rPr lang="en-US" sz="1200" dirty="0"/>
-            </a:br>
-            <a:r>
-              <a:rPr lang="en-US" sz="1200" dirty="0"/>
-              <a:t>NOT "DNA"[Mesh]</a:t>
-            </a:r>
-            <a:br>
-              <a:rPr lang="en-US" sz="1200" dirty="0"/>
-            </a:br>
-            <a:r>
-              <a:rPr lang="en-US" sz="1200" dirty="0"/>
-              <a:t>NOT "Legal Case"[Publication Type]</a:t>
-            </a:r>
-            <a:br>
-              <a:rPr lang="en-US" sz="1200" dirty="0"/>
-            </a:br>
-            <a:r>
-              <a:rPr lang="en-US" sz="1200" dirty="0"/>
-              <a:t>NOT "Machine Learning"[Mesh]</a:t>
-            </a:r>
-            <a:br>
-              <a:rPr lang="en-US" sz="1200" dirty="0"/>
-            </a:br>
-            <a:r>
-              <a:rPr lang="en-US" sz="1200" dirty="0"/>
-              <a:t>NOT "Meta-Analysis" [Publication Type]</a:t>
-            </a:r>
-            <a:br>
-              <a:rPr lang="en-US" sz="1200" dirty="0"/>
-            </a:br>
-            <a:r>
-              <a:rPr lang="en-US" sz="1200" dirty="0"/>
-              <a:t>NOT "Observational Study"[Publication Type]</a:t>
-            </a:r>
-            <a:br>
-              <a:rPr lang="en-US" sz="1200" dirty="0"/>
-            </a:br>
-            <a:r>
-              <a:rPr lang="en-US" sz="1200" dirty="0"/>
-              <a:t>NOT "Patient Positioning"[Mesh]</a:t>
-            </a:r>
-            <a:br>
-              <a:rPr lang="en-US" sz="1200" dirty="0"/>
-            </a:br>
-            <a:r>
-              <a:rPr lang="en-US" sz="1200" dirty="0"/>
-              <a:t>NOT "Prognosis"[Mesh]</a:t>
-            </a:r>
-            <a:br>
-              <a:rPr lang="en-US" sz="1200" dirty="0"/>
-            </a:br>
-            <a:r>
-              <a:rPr lang="en-US" sz="1200" dirty="0"/>
-              <a:t>NOT "Phantoms, Imaging"[Mesh]</a:t>
-            </a:r>
-            <a:br>
-              <a:rPr lang="en-US" sz="1200" dirty="0"/>
-            </a:br>
-            <a:r>
-              <a:rPr lang="en-US" sz="1200" dirty="0"/>
-              <a:t>NOT "Radiation Protection"[Mesh]</a:t>
-            </a:r>
-            <a:br>
-              <a:rPr lang="en-US" sz="1200" dirty="0"/>
-            </a:br>
-            <a:r>
-              <a:rPr lang="en-US" sz="1200" dirty="0"/>
-              <a:t>NOT "Radiology, Interventional"[Mesh]</a:t>
-            </a:r>
-            <a:br>
-              <a:rPr lang="en-US" sz="1200" dirty="0"/>
-            </a:br>
-            <a:r>
-              <a:rPr lang="en-US" sz="1200" dirty="0"/>
-              <a:t>NOT "Radiometry"[Mesh]</a:t>
-            </a:r>
-            <a:br>
-              <a:rPr lang="en-US" sz="1200" dirty="0"/>
-            </a:br>
-            <a:r>
-              <a:rPr lang="en-US" sz="1200" dirty="0"/>
-              <a:t>NOT "Radiotherapy Planning, Computer-Assisted"[Mesh]</a:t>
-            </a:r>
-            <a:br>
-              <a:rPr lang="en-US" sz="1200" dirty="0"/>
-            </a:br>
-            <a:r>
-              <a:rPr lang="en-US" sz="1200" dirty="0"/>
-              <a:t>NOT "Radiotherapy Setup Errors"[Mesh]</a:t>
-            </a:r>
-            <a:br>
-              <a:rPr lang="en-US" sz="1200" dirty="0"/>
-            </a:br>
-            <a:r>
-              <a:rPr lang="en-US" sz="1200" dirty="0"/>
-              <a:t>NOT "Retrospective Studies"[Mesh]</a:t>
-            </a:r>
-            <a:br>
-              <a:rPr lang="en-US" sz="1200" dirty="0"/>
-            </a:br>
-            <a:r>
-              <a:rPr lang="en-US" sz="1200" dirty="0"/>
-              <a:t>NOT "Software"[Mesh]</a:t>
-            </a:r>
-            <a:br>
-              <a:rPr lang="en-US" sz="1200" dirty="0"/>
-            </a:br>
-            <a:r>
-              <a:rPr lang="en-US" sz="1200" dirty="0"/>
-              <a:t>NOT "Survival Analysis"[Mesh]</a:t>
-            </a:r>
-            <a:br>
-              <a:rPr lang="en-US" sz="1200" dirty="0"/>
-            </a:br>
-            <a:r>
-              <a:rPr lang="en-US" sz="1200" dirty="0"/>
-              <a:t>NOT "Quality Assurance, Health Care"[Mesh]</a:t>
-            </a:r>
-            <a:br>
-              <a:rPr lang="en-US" sz="1200" dirty="0"/>
-            </a:br>
-            <a:r>
-              <a:rPr lang="en-US" sz="1200" dirty="0"/>
-              <a:t>NOT "Quality Control"[Mesh]</a:t>
-            </a:r>
-            <a:br>
-              <a:rPr lang="en-US" sz="1200" dirty="0"/>
-            </a:br>
-            <a:r>
-              <a:rPr lang="en-US" sz="1200" dirty="0"/>
-              <a:t>NOT "Uncertainty"[Mesh]</a:t>
-            </a:r>
-            <a:br>
-              <a:rPr lang="en-US" sz="1200" dirty="0"/>
-            </a:br>
-            <a:r>
-              <a:rPr lang="en-US" sz="1200" dirty="0"/>
-              <a:t>AND "English" [LA]</a:t>
-            </a:r>
-          </a:p>
-        </p:txBody>
-      </p:sp>
-      <p:sp>
-        <p:nvSpPr>
-          <p:cNvPr id="3" name="Content Placeholder 2">
-            <a:extLst>
-              <a:ext uri="{FF2B5EF4-FFF2-40B4-BE49-F238E27FC236}">
-                <a16:creationId xmlns:a16="http://schemas.microsoft.com/office/drawing/2014/main" id="{43BB1DA0-5C2C-3D42-9701-B21381A6ECC9}"/>
-              </a:ext>
-            </a:extLst>
-          </p:cNvPr>
-          <p:cNvSpPr>
-            <a:spLocks noGrp="1"/>
-          </p:cNvSpPr>
-          <p:nvPr>
-            <p:ph idx="1"/>
-          </p:nvPr>
-        </p:nvSpPr>
-        <p:spPr>
-          <a:xfrm>
-            <a:off x="838200" y="6241009"/>
-            <a:ext cx="10515600" cy="616991"/>
-          </a:xfrm>
-        </p:spPr>
-        <p:txBody>
-          <a:bodyPr/>
-          <a:lstStyle/>
-          <a:p>
-            <a:pPr marL="0" indent="0" algn="ctr">
-              <a:buNone/>
-            </a:pPr>
-            <a:r>
-              <a:rPr lang="en-US" dirty="0"/>
-              <a:t>N = 231</a:t>
-            </a:r>
-          </a:p>
-        </p:txBody>
-      </p:sp>
-    </p:spTree>
-    <p:extLst>
-      <p:ext uri="{BB962C8B-B14F-4D97-AF65-F5344CB8AC3E}">
-        <p14:creationId xmlns:p14="http://schemas.microsoft.com/office/powerpoint/2010/main" val="1660134981"/>
-      </p:ext>
-    </p:extLst>
-  </p:cSld>
-  <p:clrMapOvr>
-    <a:masterClrMapping/>
-  </p:clrMapOvr>
-</p:sld>
-</file>
-
-<file path=ppt/slides/slide4.xml><?xml version="1.0" encoding="utf-8"?>
-<p:sld xmlns:a="http://schemas.openxmlformats.org/drawingml/2006/main" xmlns:r="http://schemas.openxmlformats.org/officeDocument/2006/relationships" xmlns:p="http://schemas.openxmlformats.org/presentationml/2006/main">
-  <p:cSld>
-    <p:spTree>
-      <p:nvGrpSpPr>
-        <p:cNvPr id="1" name=""/>
-        <p:cNvGrpSpPr/>
-        <p:nvPr/>
-      </p:nvGrpSpPr>
-      <p:grpSpPr>
-        <a:xfrm>
-          <a:off x="0" y="0"/>
-          <a:ext cx="0" cy="0"/>
-          <a:chOff x="0" y="0"/>
-          <a:chExt cx="0" cy="0"/>
-        </a:xfrm>
-      </p:grpSpPr>
-      <p:sp>
-        <p:nvSpPr>
-          <p:cNvPr id="2" name="Title 1">
-            <a:extLst>
-              <a:ext uri="{FF2B5EF4-FFF2-40B4-BE49-F238E27FC236}">
-                <a16:creationId xmlns:a16="http://schemas.microsoft.com/office/drawing/2014/main" id="{6D804DAD-F4D2-EB48-9443-47E91A94D708}"/>
-              </a:ext>
-            </a:extLst>
-          </p:cNvPr>
-          <p:cNvSpPr>
-            <a:spLocks noGrp="1"/>
-          </p:cNvSpPr>
-          <p:nvPr>
-            <p:ph type="title"/>
-          </p:nvPr>
-        </p:nvSpPr>
-        <p:spPr>
-          <a:xfrm>
-            <a:off x="838200" y="0"/>
-            <a:ext cx="10515600" cy="6241009"/>
-          </a:xfrm>
-        </p:spPr>
-        <p:txBody>
-          <a:bodyPr>
-            <a:noAutofit/>
-          </a:bodyPr>
-          <a:lstStyle/>
-          <a:p>
-            <a:r>
-              <a:rPr lang="en-US" sz="1200" dirty="0"/>
-              <a:t>("Mathematical Concepts"[Mesh] OR "Operations Research"[Mesh] OR "operations research" OR "operational research")</a:t>
-            </a:r>
-            <a:br>
-              <a:rPr lang="en-US" sz="1200" dirty="0"/>
-            </a:br>
-            <a:r>
-              <a:rPr lang="en-US" sz="1200" dirty="0"/>
-              <a:t>AND</a:t>
-            </a:r>
-            <a:br>
-              <a:rPr lang="en-US" sz="1200" dirty="0"/>
-            </a:br>
-            <a:r>
-              <a:rPr lang="en-US" sz="1200" dirty="0"/>
-              <a:t>("Radiotherapy"[Mesh] OR "radiotherapy" OR "radiation therapy")</a:t>
-            </a:r>
-            <a:br>
-              <a:rPr lang="en-US" sz="1200" dirty="0"/>
-            </a:br>
-            <a:r>
-              <a:rPr lang="en-US" sz="1200" dirty="0"/>
-              <a:t>AND</a:t>
-            </a:r>
-            <a:br>
-              <a:rPr lang="en-US" sz="1200" dirty="0"/>
-            </a:br>
-            <a:r>
-              <a:rPr lang="en-US" sz="1200" dirty="0"/>
-              <a:t>("Clinical Decision-Making"[Mesh] OR "Decision Support Techniques"[Mesh] OR "Decision Support Systems, Clinical"[Mesh] OR</a:t>
-            </a:r>
-            <a:br>
-              <a:rPr lang="en-US" sz="1200" dirty="0"/>
-            </a:br>
-            <a:r>
-              <a:rPr lang="en-US" sz="1200" dirty="0"/>
-              <a:t>"Decision Making"[Mesh] OR "Decision Theory"[Mesh] OR "Clinical Decision Rules"[Mesh] OR "Decision Trees"[Mesh] OR</a:t>
-            </a:r>
-            <a:br>
-              <a:rPr lang="en-US" sz="1200" dirty="0"/>
-            </a:br>
-            <a:r>
-              <a:rPr lang="en-US" sz="1200" dirty="0"/>
-              <a:t>"decision")</a:t>
-            </a:r>
-            <a:br>
-              <a:rPr lang="en-US" sz="1200" dirty="0"/>
-            </a:br>
-            <a:r>
-              <a:rPr lang="en-US" sz="1200" dirty="0"/>
-              <a:t>NOT "Anisotropy"[Mesh]</a:t>
-            </a:r>
-            <a:br>
-              <a:rPr lang="en-US" sz="1200" dirty="0"/>
-            </a:br>
-            <a:r>
-              <a:rPr lang="en-US" sz="1200" dirty="0"/>
-              <a:t>NOT "Artificial Intelligence"[Mesh]</a:t>
-            </a:r>
-            <a:br>
-              <a:rPr lang="en-US" sz="1200" dirty="0"/>
-            </a:br>
-            <a:r>
-              <a:rPr lang="en-US" sz="1200" dirty="0"/>
-              <a:t>NOT "Bionics"[Mesh]</a:t>
-            </a:r>
-            <a:br>
-              <a:rPr lang="en-US" sz="1200" dirty="0"/>
-            </a:br>
-            <a:r>
-              <a:rPr lang="en-US" sz="1200" dirty="0"/>
-              <a:t>NOT "Cells, Cultured"[Mesh]</a:t>
-            </a:r>
-            <a:br>
-              <a:rPr lang="en-US" sz="1200" dirty="0"/>
-            </a:br>
-            <a:r>
-              <a:rPr lang="en-US" sz="1200" dirty="0"/>
-              <a:t>NOT "Clinical Trial"[Publication Type]</a:t>
-            </a:r>
-            <a:br>
-              <a:rPr lang="en-US" sz="1200" dirty="0"/>
-            </a:br>
-            <a:r>
-              <a:rPr lang="en-US" sz="1200" dirty="0"/>
-              <a:t>NOT "Cryopreservation"[Mesh]</a:t>
-            </a:r>
-            <a:br>
-              <a:rPr lang="en-US" sz="1200" dirty="0"/>
-            </a:br>
-            <a:r>
-              <a:rPr lang="en-US" sz="1200" dirty="0"/>
-              <a:t>NOT "Diagnosis, Differential"[Mesh]</a:t>
-            </a:r>
-            <a:br>
-              <a:rPr lang="en-US" sz="1200" dirty="0"/>
-            </a:br>
-            <a:r>
-              <a:rPr lang="en-US" sz="1200" dirty="0"/>
-              <a:t>NOT "Disaster Planning"[Mesh]</a:t>
-            </a:r>
-            <a:br>
-              <a:rPr lang="en-US" sz="1200" dirty="0"/>
-            </a:br>
-            <a:r>
-              <a:rPr lang="en-US" sz="1200" dirty="0"/>
-              <a:t>NOT "DNA"[Mesh]</a:t>
-            </a:r>
-            <a:br>
-              <a:rPr lang="en-US" sz="1200" dirty="0"/>
-            </a:br>
-            <a:r>
-              <a:rPr lang="en-US" sz="1200" dirty="0"/>
-              <a:t>NOT "Legal Case"[Publication Type]</a:t>
-            </a:r>
-            <a:br>
-              <a:rPr lang="en-US" sz="1200" dirty="0"/>
-            </a:br>
-            <a:r>
-              <a:rPr lang="en-US" sz="1200" dirty="0"/>
-              <a:t>NOT "Machine Learning"[Mesh]</a:t>
-            </a:r>
-            <a:br>
-              <a:rPr lang="en-US" sz="1200" dirty="0"/>
-            </a:br>
-            <a:r>
-              <a:rPr lang="en-US" sz="1200" dirty="0"/>
-              <a:t>NOT "Meta-Analysis" [Publication Type]</a:t>
-            </a:r>
-            <a:br>
-              <a:rPr lang="en-US" sz="1200" dirty="0"/>
-            </a:br>
-            <a:r>
-              <a:rPr lang="en-US" sz="1200" dirty="0"/>
-              <a:t>NOT "Observational Study"[Publication Type]</a:t>
-            </a:r>
-            <a:br>
-              <a:rPr lang="en-US" sz="1200" dirty="0"/>
-            </a:br>
-            <a:r>
-              <a:rPr lang="en-US" sz="1200" dirty="0"/>
-              <a:t>NOT "Patient Positioning"[Mesh]</a:t>
-            </a:r>
-            <a:br>
-              <a:rPr lang="en-US" sz="1200" dirty="0"/>
-            </a:br>
-            <a:r>
-              <a:rPr lang="en-US" sz="1200" dirty="0"/>
-              <a:t>NOT "Prognosis"[Mesh]</a:t>
-            </a:r>
-            <a:br>
-              <a:rPr lang="en-US" sz="1200" dirty="0"/>
-            </a:br>
-            <a:r>
-              <a:rPr lang="en-US" sz="1200" dirty="0"/>
-              <a:t>NOT "Phantoms, Imaging"[Mesh]</a:t>
-            </a:r>
-            <a:br>
-              <a:rPr lang="en-US" sz="1200" dirty="0"/>
-            </a:br>
-            <a:r>
-              <a:rPr lang="en-US" sz="1200" dirty="0"/>
-              <a:t>NOT "Radiation Protection"[Mesh]</a:t>
-            </a:r>
-            <a:br>
-              <a:rPr lang="en-US" sz="1200" dirty="0"/>
-            </a:br>
-            <a:r>
-              <a:rPr lang="en-US" sz="1200" dirty="0"/>
-              <a:t>NOT "Radiology, Interventional"[Mesh]</a:t>
-            </a:r>
-            <a:br>
-              <a:rPr lang="en-US" sz="1200" dirty="0"/>
-            </a:br>
-            <a:r>
-              <a:rPr lang="en-US" sz="1200" dirty="0"/>
-              <a:t>NOT "Radiometry"[Mesh]</a:t>
-            </a:r>
-            <a:br>
-              <a:rPr lang="en-US" sz="1200" dirty="0"/>
-            </a:br>
-            <a:r>
-              <a:rPr lang="en-US" sz="1200" dirty="0"/>
-              <a:t>NOT "Radiotherapy Planning, Computer-Assisted"[Mesh]</a:t>
-            </a:r>
-            <a:br>
-              <a:rPr lang="en-US" sz="1200" dirty="0"/>
-            </a:br>
-            <a:r>
-              <a:rPr lang="en-US" sz="1200" dirty="0"/>
-              <a:t>NOT "Radiotherapy Setup Errors"[Mesh]</a:t>
-            </a:r>
-            <a:br>
-              <a:rPr lang="en-US" sz="1200" dirty="0"/>
-            </a:br>
-            <a:r>
-              <a:rPr lang="en-US" sz="1200" dirty="0"/>
-              <a:t>NOT "Retrospective Studies"[Mesh]</a:t>
-            </a:r>
-            <a:br>
-              <a:rPr lang="en-US" sz="1200" dirty="0"/>
-            </a:br>
-            <a:r>
-              <a:rPr lang="en-US" sz="1200" dirty="0"/>
-              <a:t>NOT "Software"[Mesh]</a:t>
-            </a:r>
-            <a:br>
-              <a:rPr lang="en-US" sz="1200" dirty="0"/>
-            </a:br>
-            <a:r>
-              <a:rPr lang="en-US" sz="1200" dirty="0"/>
-              <a:t>NOT "Survival Analysis"[Mesh]</a:t>
-            </a:r>
-            <a:br>
-              <a:rPr lang="en-US" sz="1200" dirty="0"/>
-            </a:br>
-            <a:r>
-              <a:rPr lang="en-US" sz="1200" dirty="0"/>
-              <a:t>NOT "Quality Assurance, Health Care"[Mesh]</a:t>
-            </a:r>
-            <a:br>
-              <a:rPr lang="en-US" sz="1200" dirty="0"/>
-            </a:br>
-            <a:r>
-              <a:rPr lang="en-US" sz="1200" dirty="0"/>
-              <a:t>NOT "Quality Control"[Mesh]</a:t>
-            </a:r>
-            <a:br>
-              <a:rPr lang="en-US" sz="1200" dirty="0"/>
-            </a:br>
-            <a:r>
-              <a:rPr lang="en-US" sz="1200" dirty="0"/>
-              <a:t>NOT "Uncertainty"[Mesh]</a:t>
-            </a:r>
-            <a:br>
-              <a:rPr lang="en-US" sz="1200" dirty="0"/>
-            </a:br>
-            <a:r>
-              <a:rPr lang="en-US" sz="1200" dirty="0"/>
-              <a:t>AND "English" [LA]</a:t>
-            </a:r>
-            <a:br>
-              <a:rPr lang="en-US" sz="1200" dirty="0"/>
-            </a:br>
-            <a:r>
-              <a:rPr lang="en-US" sz="1200" dirty="0"/>
-              <a:t>AND 2013:2022[</a:t>
-            </a:r>
-            <a:r>
-              <a:rPr lang="en-US" sz="1200" dirty="0" err="1"/>
-              <a:t>dp</a:t>
-            </a:r>
-            <a:r>
-              <a:rPr lang="en-US" sz="1200" dirty="0"/>
-              <a:t>]</a:t>
-            </a:r>
-          </a:p>
-        </p:txBody>
-      </p:sp>
-      <p:sp>
-        <p:nvSpPr>
-          <p:cNvPr id="3" name="Content Placeholder 2">
-            <a:extLst>
-              <a:ext uri="{FF2B5EF4-FFF2-40B4-BE49-F238E27FC236}">
-                <a16:creationId xmlns:a16="http://schemas.microsoft.com/office/drawing/2014/main" id="{43BB1DA0-5C2C-3D42-9701-B21381A6ECC9}"/>
-              </a:ext>
-            </a:extLst>
-          </p:cNvPr>
-          <p:cNvSpPr>
-            <a:spLocks noGrp="1"/>
-          </p:cNvSpPr>
-          <p:nvPr>
-            <p:ph idx="1"/>
-          </p:nvPr>
-        </p:nvSpPr>
-        <p:spPr>
-          <a:xfrm>
-            <a:off x="838200" y="6241009"/>
-            <a:ext cx="10515600" cy="616991"/>
-          </a:xfrm>
-        </p:spPr>
-        <p:txBody>
-          <a:bodyPr/>
-          <a:lstStyle/>
-          <a:p>
-            <a:pPr marL="0" indent="0" algn="ctr">
-              <a:buNone/>
-            </a:pPr>
-            <a:r>
-              <a:rPr lang="en-US" dirty="0"/>
-              <a:t>N = 107</a:t>
-            </a:r>
-          </a:p>
-        </p:txBody>
-      </p:sp>
-    </p:spTree>
-    <p:extLst>
-      <p:ext uri="{BB962C8B-B14F-4D97-AF65-F5344CB8AC3E}">
-        <p14:creationId xmlns:p14="http://schemas.microsoft.com/office/powerpoint/2010/main" val="225633176"/>
-      </p:ext>
-    </p:extLst>
-  </p:cSld>
-  <p:clrMapOvr>
-    <a:masterClrMapping/>
-  </p:clrMapOvr>
-</p:sld>
-</file>
-
-<file path=ppt/slides/slide5.xml><?xml version="1.0" encoding="utf-8"?>
+<file path=ppt/slides/slide11.xml><?xml version="1.0" encoding="utf-8"?>
 <p:sld xmlns:a="http://schemas.openxmlformats.org/drawingml/2006/main" xmlns:r="http://schemas.openxmlformats.org/officeDocument/2006/relationships" xmlns:p="http://schemas.openxmlformats.org/presentationml/2006/main">
   <p:cSld>
     <p:spTree>
@@ -4559,7 +3818,7 @@
             <a:pPr algn="ctr"/>
             <a:r>
               <a:rPr lang="en-US" sz="1400" dirty="0"/>
-              <a:t>(n = 2,225)</a:t>
+              <a:t>(n = 393)</a:t>
             </a:r>
           </a:p>
         </p:txBody>
@@ -4671,7 +3930,7 @@
             <a:pPr algn="ctr"/>
             <a:r>
               <a:rPr lang="en-US" sz="1400" dirty="0"/>
-              <a:t>(n = 287)</a:t>
+              <a:t>(n = 59)</a:t>
             </a:r>
           </a:p>
         </p:txBody>
@@ -4727,7 +3986,7 @@
             <a:pPr algn="ctr"/>
             <a:r>
               <a:rPr lang="en-US" sz="1400" dirty="0"/>
-              <a:t>(n = 231)</a:t>
+              <a:t>(n = 56)</a:t>
             </a:r>
           </a:p>
         </p:txBody>
@@ -4776,14 +4035,14 @@
             <a:pPr algn="ctr"/>
             <a:r>
               <a:rPr lang="en-US" sz="1400" dirty="0"/>
-              <a:t>Articles published &gt;2012</a:t>
+              <a:t>Articles published &gt;2000</a:t>
             </a:r>
           </a:p>
           <a:p>
             <a:pPr algn="ctr"/>
             <a:r>
               <a:rPr lang="en-US" sz="1400" dirty="0"/>
-              <a:t>(n = 107)</a:t>
+              <a:t>(n = 54)</a:t>
             </a:r>
           </a:p>
         </p:txBody>
@@ -4839,7 +4098,7 @@
             <a:pPr algn="ctr"/>
             <a:r>
               <a:rPr lang="en-US" sz="1400" dirty="0"/>
-              <a:t>(n = 124)</a:t>
+              <a:t>(n = 2)</a:t>
             </a:r>
           </a:p>
         </p:txBody>
@@ -4895,7 +4154,7 @@
             <a:pPr algn="ctr"/>
             <a:r>
               <a:rPr lang="en-US" sz="1400" dirty="0"/>
-              <a:t>(n = 56)</a:t>
+              <a:t>(n = 3)</a:t>
             </a:r>
           </a:p>
         </p:txBody>
@@ -4951,7 +4210,7 @@
             <a:pPr algn="ctr"/>
             <a:r>
               <a:rPr lang="en-US" sz="1400" dirty="0"/>
-              <a:t>(n = 1,938)</a:t>
+              <a:t>(n = 334)</a:t>
             </a:r>
           </a:p>
         </p:txBody>
@@ -5582,6 +4841,3539 @@
     <p:extLst>
       <p:ext uri="{BB962C8B-B14F-4D97-AF65-F5344CB8AC3E}">
         <p14:creationId xmlns:p14="http://schemas.microsoft.com/office/powerpoint/2010/main" val="886170846"/>
+      </p:ext>
+    </p:extLst>
+  </p:cSld>
+  <p:clrMapOvr>
+    <a:masterClrMapping/>
+  </p:clrMapOvr>
+</p:sld>
+</file>
+
+<file path=ppt/slides/slide12.xml><?xml version="1.0" encoding="utf-8"?>
+<p:sld xmlns:a="http://schemas.openxmlformats.org/drawingml/2006/main" xmlns:r="http://schemas.openxmlformats.org/officeDocument/2006/relationships" xmlns:p="http://schemas.openxmlformats.org/presentationml/2006/main">
+  <p:cSld>
+    <p:spTree>
+      <p:nvGrpSpPr>
+        <p:cNvPr id="1" name=""/>
+        <p:cNvGrpSpPr/>
+        <p:nvPr/>
+      </p:nvGrpSpPr>
+      <p:grpSpPr>
+        <a:xfrm>
+          <a:off x="0" y="0"/>
+          <a:ext cx="0" cy="0"/>
+          <a:chOff x="0" y="0"/>
+          <a:chExt cx="0" cy="0"/>
+        </a:xfrm>
+      </p:grpSpPr>
+      <p:sp>
+        <p:nvSpPr>
+          <p:cNvPr id="2" name="Title 1">
+            <a:extLst>
+              <a:ext uri="{FF2B5EF4-FFF2-40B4-BE49-F238E27FC236}">
+                <a16:creationId xmlns:a16="http://schemas.microsoft.com/office/drawing/2014/main" id="{DB0C6CD3-7EBA-E7B5-8CB6-3D2E2F53AEFB}"/>
+              </a:ext>
+            </a:extLst>
+          </p:cNvPr>
+          <p:cNvSpPr>
+            <a:spLocks noGrp="1"/>
+          </p:cNvSpPr>
+          <p:nvPr>
+            <p:ph type="title"/>
+          </p:nvPr>
+        </p:nvSpPr>
+        <p:spPr>
+          <a:xfrm>
+            <a:off x="838200" y="2766218"/>
+            <a:ext cx="10515600" cy="1325563"/>
+          </a:xfrm>
+        </p:spPr>
+        <p:txBody>
+          <a:bodyPr/>
+          <a:lstStyle/>
+          <a:p>
+            <a:pPr algn="ctr"/>
+            <a:r>
+              <a:rPr lang="en-US" dirty="0"/>
+              <a:t>Extra Queries</a:t>
+            </a:r>
+          </a:p>
+        </p:txBody>
+      </p:sp>
+    </p:spTree>
+    <p:extLst>
+      <p:ext uri="{BB962C8B-B14F-4D97-AF65-F5344CB8AC3E}">
+        <p14:creationId xmlns:p14="http://schemas.microsoft.com/office/powerpoint/2010/main" val="3043630416"/>
+      </p:ext>
+    </p:extLst>
+  </p:cSld>
+  <p:clrMapOvr>
+    <a:masterClrMapping/>
+  </p:clrMapOvr>
+</p:sld>
+</file>
+
+<file path=ppt/slides/slide13.xml><?xml version="1.0" encoding="utf-8"?>
+<p:sld xmlns:a="http://schemas.openxmlformats.org/drawingml/2006/main" xmlns:r="http://schemas.openxmlformats.org/officeDocument/2006/relationships" xmlns:p="http://schemas.openxmlformats.org/presentationml/2006/main">
+  <p:cSld>
+    <p:spTree>
+      <p:nvGrpSpPr>
+        <p:cNvPr id="1" name=""/>
+        <p:cNvGrpSpPr/>
+        <p:nvPr/>
+      </p:nvGrpSpPr>
+      <p:grpSpPr>
+        <a:xfrm>
+          <a:off x="0" y="0"/>
+          <a:ext cx="0" cy="0"/>
+          <a:chOff x="0" y="0"/>
+          <a:chExt cx="0" cy="0"/>
+        </a:xfrm>
+      </p:grpSpPr>
+      <p:sp>
+        <p:nvSpPr>
+          <p:cNvPr id="2" name="Title 1">
+            <a:extLst>
+              <a:ext uri="{FF2B5EF4-FFF2-40B4-BE49-F238E27FC236}">
+                <a16:creationId xmlns:a16="http://schemas.microsoft.com/office/drawing/2014/main" id="{6D804DAD-F4D2-EB48-9443-47E91A94D708}"/>
+              </a:ext>
+            </a:extLst>
+          </p:cNvPr>
+          <p:cNvSpPr>
+            <a:spLocks noGrp="1"/>
+          </p:cNvSpPr>
+          <p:nvPr>
+            <p:ph type="title"/>
+          </p:nvPr>
+        </p:nvSpPr>
+        <p:spPr>
+          <a:xfrm>
+            <a:off x="838200" y="0"/>
+            <a:ext cx="10515600" cy="6241009"/>
+          </a:xfrm>
+        </p:spPr>
+        <p:txBody>
+          <a:bodyPr>
+            <a:noAutofit/>
+          </a:bodyPr>
+          <a:lstStyle/>
+          <a:p>
+            <a:r>
+              <a:rPr lang="en-US" sz="1200" dirty="0"/>
+              <a:t>("Mathematical Concepts"[Mesh] OR "Operations Research"[Mesh] OR "operations research" OR "operational research")</a:t>
+            </a:r>
+            <a:br>
+              <a:rPr lang="en-US" sz="1200" dirty="0"/>
+            </a:br>
+            <a:r>
+              <a:rPr lang="en-US" sz="1200" dirty="0"/>
+              <a:t>AND</a:t>
+            </a:r>
+            <a:br>
+              <a:rPr lang="en-US" sz="1200" dirty="0"/>
+            </a:br>
+            <a:r>
+              <a:rPr lang="en-US" sz="1200" dirty="0"/>
+              <a:t>("Radiotherapy"[Mesh] OR "radiotherapy" OR "radiation therapy")</a:t>
+            </a:r>
+            <a:br>
+              <a:rPr lang="en-US" sz="1200" dirty="0"/>
+            </a:br>
+            <a:r>
+              <a:rPr lang="en-US" sz="1200" dirty="0"/>
+              <a:t>AND</a:t>
+            </a:r>
+            <a:br>
+              <a:rPr lang="en-US" sz="1200" dirty="0"/>
+            </a:br>
+            <a:r>
+              <a:rPr lang="en-US" sz="1200" dirty="0"/>
+              <a:t>("Clinical Decision-Making"[Mesh] OR "Decision Support Techniques"[Mesh] OR "Decision Support Systems, Clinical"[Mesh] OR</a:t>
+            </a:r>
+            <a:br>
+              <a:rPr lang="en-US" sz="1200" dirty="0"/>
+            </a:br>
+            <a:r>
+              <a:rPr lang="en-US" sz="1200" dirty="0"/>
+              <a:t>"Decision Making"[Mesh] OR "Decision Theory"[Mesh] OR "Clinical Decision Rules"[Mesh] OR "Decision Trees"[Mesh] OR</a:t>
+            </a:r>
+            <a:br>
+              <a:rPr lang="en-US" sz="1200" dirty="0"/>
+            </a:br>
+            <a:r>
+              <a:rPr lang="en-US" sz="1200" dirty="0"/>
+              <a:t>"decision")</a:t>
+            </a:r>
+            <a:br>
+              <a:rPr lang="en-US" sz="1200" dirty="0"/>
+            </a:br>
+            <a:r>
+              <a:rPr lang="en-US" sz="1200" dirty="0"/>
+              <a:t>NOT "Anisotropy"[Mesh]</a:t>
+            </a:r>
+            <a:br>
+              <a:rPr lang="en-US" sz="1200" dirty="0"/>
+            </a:br>
+            <a:r>
+              <a:rPr lang="en-US" sz="1200" dirty="0"/>
+              <a:t>NOT "Artificial Intelligence"[Mesh]</a:t>
+            </a:r>
+            <a:br>
+              <a:rPr lang="en-US" sz="1200" dirty="0"/>
+            </a:br>
+            <a:r>
+              <a:rPr lang="en-US" sz="1200" dirty="0"/>
+              <a:t>NOT "Bionics"[Mesh]</a:t>
+            </a:r>
+            <a:br>
+              <a:rPr lang="en-US" sz="1200" dirty="0"/>
+            </a:br>
+            <a:r>
+              <a:rPr lang="en-US" sz="1200" dirty="0"/>
+              <a:t>NOT "Cells, Cultured"[Mesh]</a:t>
+            </a:r>
+            <a:br>
+              <a:rPr lang="en-US" sz="1200" dirty="0"/>
+            </a:br>
+            <a:r>
+              <a:rPr lang="en-US" sz="1200" dirty="0"/>
+              <a:t>NOT "Clinical Trial"[Publication Type]</a:t>
+            </a:r>
+            <a:br>
+              <a:rPr lang="en-US" sz="1200" dirty="0"/>
+            </a:br>
+            <a:r>
+              <a:rPr lang="en-US" sz="1200" dirty="0"/>
+              <a:t>NOT "Cryopreservation"[Mesh]</a:t>
+            </a:r>
+            <a:br>
+              <a:rPr lang="en-US" sz="1200" dirty="0"/>
+            </a:br>
+            <a:r>
+              <a:rPr lang="en-US" sz="1200" dirty="0"/>
+              <a:t>NOT "Diagnosis, Differential"[Mesh]</a:t>
+            </a:r>
+            <a:br>
+              <a:rPr lang="en-US" sz="1200" dirty="0"/>
+            </a:br>
+            <a:r>
+              <a:rPr lang="en-US" sz="1200" dirty="0"/>
+              <a:t>NOT "Disaster Planning"[Mesh]</a:t>
+            </a:r>
+            <a:br>
+              <a:rPr lang="en-US" sz="1200" dirty="0"/>
+            </a:br>
+            <a:r>
+              <a:rPr lang="en-US" sz="1200" dirty="0"/>
+              <a:t>NOT "DNA"[Mesh]</a:t>
+            </a:r>
+            <a:br>
+              <a:rPr lang="en-US" sz="1200" dirty="0"/>
+            </a:br>
+            <a:r>
+              <a:rPr lang="en-US" sz="1200" dirty="0"/>
+              <a:t>NOT "Legal Case"[Publication Type]</a:t>
+            </a:r>
+            <a:br>
+              <a:rPr lang="en-US" sz="1200" dirty="0"/>
+            </a:br>
+            <a:r>
+              <a:rPr lang="en-US" sz="1200" dirty="0"/>
+              <a:t>NOT "Machine Learning"[Mesh]</a:t>
+            </a:r>
+            <a:br>
+              <a:rPr lang="en-US" sz="1200" dirty="0"/>
+            </a:br>
+            <a:r>
+              <a:rPr lang="en-US" sz="1200" dirty="0"/>
+              <a:t>NOT "Meta-Analysis" [Publication Type]</a:t>
+            </a:r>
+            <a:br>
+              <a:rPr lang="en-US" sz="1200" dirty="0"/>
+            </a:br>
+            <a:r>
+              <a:rPr lang="en-US" sz="1200" dirty="0"/>
+              <a:t>NOT "Observational Study"[Publication Type]</a:t>
+            </a:r>
+            <a:br>
+              <a:rPr lang="en-US" sz="1200" dirty="0"/>
+            </a:br>
+            <a:r>
+              <a:rPr lang="en-US" sz="1200" dirty="0"/>
+              <a:t>NOT "Patient Positioning"[Mesh]</a:t>
+            </a:r>
+            <a:br>
+              <a:rPr lang="en-US" sz="1200" dirty="0"/>
+            </a:br>
+            <a:r>
+              <a:rPr lang="en-US" sz="1200" dirty="0"/>
+              <a:t>NOT "Prognosis"[Mesh]</a:t>
+            </a:r>
+            <a:br>
+              <a:rPr lang="en-US" sz="1200" dirty="0"/>
+            </a:br>
+            <a:r>
+              <a:rPr lang="en-US" sz="1200" dirty="0"/>
+              <a:t>NOT "Phantoms, Imaging"[Mesh]</a:t>
+            </a:r>
+            <a:br>
+              <a:rPr lang="en-US" sz="1200" dirty="0"/>
+            </a:br>
+            <a:r>
+              <a:rPr lang="en-US" sz="1200" dirty="0"/>
+              <a:t>NOT "Radiation Protection"[Mesh]</a:t>
+            </a:r>
+            <a:br>
+              <a:rPr lang="en-US" sz="1200" dirty="0"/>
+            </a:br>
+            <a:r>
+              <a:rPr lang="en-US" sz="1200" dirty="0"/>
+              <a:t>NOT "Radiology, Interventional"[Mesh]</a:t>
+            </a:r>
+            <a:br>
+              <a:rPr lang="en-US" sz="1200" dirty="0"/>
+            </a:br>
+            <a:r>
+              <a:rPr lang="en-US" sz="1200" dirty="0"/>
+              <a:t>NOT "Radiometry"[Mesh]</a:t>
+            </a:r>
+            <a:br>
+              <a:rPr lang="en-US" sz="1200" dirty="0"/>
+            </a:br>
+            <a:r>
+              <a:rPr lang="en-US" sz="1200" dirty="0"/>
+              <a:t>NOT "Radiotherapy Planning, Computer-Assisted"[Mesh]</a:t>
+            </a:r>
+            <a:br>
+              <a:rPr lang="en-US" sz="1200" dirty="0"/>
+            </a:br>
+            <a:r>
+              <a:rPr lang="en-US" sz="1200" dirty="0"/>
+              <a:t>NOT "Radiotherapy Setup Errors"[Mesh]</a:t>
+            </a:r>
+            <a:br>
+              <a:rPr lang="en-US" sz="1200" dirty="0"/>
+            </a:br>
+            <a:r>
+              <a:rPr lang="en-US" sz="1200" dirty="0"/>
+              <a:t>NOT "Retrospective Studies"[Mesh]</a:t>
+            </a:r>
+            <a:br>
+              <a:rPr lang="en-US" sz="1200" dirty="0"/>
+            </a:br>
+            <a:r>
+              <a:rPr lang="en-US" sz="1200" dirty="0"/>
+              <a:t>NOT "Software"[Mesh]</a:t>
+            </a:r>
+            <a:br>
+              <a:rPr lang="en-US" sz="1200" dirty="0"/>
+            </a:br>
+            <a:r>
+              <a:rPr lang="en-US" sz="1200" dirty="0"/>
+              <a:t>NOT "Survival Analysis"[Mesh]</a:t>
+            </a:r>
+            <a:br>
+              <a:rPr lang="en-US" sz="1200" dirty="0"/>
+            </a:br>
+            <a:r>
+              <a:rPr lang="en-US" sz="1200" dirty="0"/>
+              <a:t>NOT "Quality Assurance, Health Care"[Mesh]</a:t>
+            </a:r>
+            <a:br>
+              <a:rPr lang="en-US" sz="1200" dirty="0"/>
+            </a:br>
+            <a:r>
+              <a:rPr lang="en-US" sz="1200" dirty="0"/>
+              <a:t>NOT "Quality Control"[Mesh]</a:t>
+            </a:r>
+            <a:br>
+              <a:rPr lang="en-US" sz="1200" dirty="0"/>
+            </a:br>
+            <a:r>
+              <a:rPr lang="en-US" sz="1200" dirty="0"/>
+              <a:t>NOT "Uncertainty"[Mesh]</a:t>
+            </a:r>
+            <a:br>
+              <a:rPr lang="en-US" sz="1200" dirty="0"/>
+            </a:br>
+            <a:r>
+              <a:rPr lang="en-US" sz="1200" dirty="0"/>
+              <a:t>AND "English" [LA]</a:t>
+            </a:r>
+            <a:br>
+              <a:rPr lang="en-US" sz="1200" dirty="0"/>
+            </a:br>
+            <a:r>
+              <a:rPr lang="en-US" sz="1200" dirty="0"/>
+              <a:t>AND 2000:2022[</a:t>
+            </a:r>
+            <a:r>
+              <a:rPr lang="en-US" sz="1200" dirty="0" err="1"/>
+              <a:t>dp</a:t>
+            </a:r>
+            <a:r>
+              <a:rPr lang="en-US" sz="1200" dirty="0"/>
+              <a:t>]</a:t>
+            </a:r>
+          </a:p>
+        </p:txBody>
+      </p:sp>
+      <p:sp>
+        <p:nvSpPr>
+          <p:cNvPr id="3" name="Content Placeholder 2">
+            <a:extLst>
+              <a:ext uri="{FF2B5EF4-FFF2-40B4-BE49-F238E27FC236}">
+                <a16:creationId xmlns:a16="http://schemas.microsoft.com/office/drawing/2014/main" id="{43BB1DA0-5C2C-3D42-9701-B21381A6ECC9}"/>
+              </a:ext>
+            </a:extLst>
+          </p:cNvPr>
+          <p:cNvSpPr>
+            <a:spLocks noGrp="1"/>
+          </p:cNvSpPr>
+          <p:nvPr>
+            <p:ph idx="1"/>
+          </p:nvPr>
+        </p:nvSpPr>
+        <p:spPr>
+          <a:xfrm>
+            <a:off x="838200" y="6241009"/>
+            <a:ext cx="10515600" cy="616991"/>
+          </a:xfrm>
+        </p:spPr>
+        <p:txBody>
+          <a:bodyPr/>
+          <a:lstStyle/>
+          <a:p>
+            <a:pPr marL="0" indent="0" algn="ctr">
+              <a:buNone/>
+            </a:pPr>
+            <a:r>
+              <a:rPr lang="en-US" dirty="0"/>
+              <a:t>N = 200</a:t>
+            </a:r>
+          </a:p>
+        </p:txBody>
+      </p:sp>
+    </p:spTree>
+    <p:extLst>
+      <p:ext uri="{BB962C8B-B14F-4D97-AF65-F5344CB8AC3E}">
+        <p14:creationId xmlns:p14="http://schemas.microsoft.com/office/powerpoint/2010/main" val="2138476843"/>
+      </p:ext>
+    </p:extLst>
+  </p:cSld>
+  <p:clrMapOvr>
+    <a:masterClrMapping/>
+  </p:clrMapOvr>
+</p:sld>
+</file>
+
+<file path=ppt/slides/slide14.xml><?xml version="1.0" encoding="utf-8"?>
+<p:sld xmlns:a="http://schemas.openxmlformats.org/drawingml/2006/main" xmlns:r="http://schemas.openxmlformats.org/officeDocument/2006/relationships" xmlns:p="http://schemas.openxmlformats.org/presentationml/2006/main">
+  <p:cSld>
+    <p:spTree>
+      <p:nvGrpSpPr>
+        <p:cNvPr id="1" name=""/>
+        <p:cNvGrpSpPr/>
+        <p:nvPr/>
+      </p:nvGrpSpPr>
+      <p:grpSpPr>
+        <a:xfrm>
+          <a:off x="0" y="0"/>
+          <a:ext cx="0" cy="0"/>
+          <a:chOff x="0" y="0"/>
+          <a:chExt cx="0" cy="0"/>
+        </a:xfrm>
+      </p:grpSpPr>
+      <p:sp>
+        <p:nvSpPr>
+          <p:cNvPr id="2" name="Title 1">
+            <a:extLst>
+              <a:ext uri="{FF2B5EF4-FFF2-40B4-BE49-F238E27FC236}">
+                <a16:creationId xmlns:a16="http://schemas.microsoft.com/office/drawing/2014/main" id="{6D804DAD-F4D2-EB48-9443-47E91A94D708}"/>
+              </a:ext>
+            </a:extLst>
+          </p:cNvPr>
+          <p:cNvSpPr>
+            <a:spLocks noGrp="1"/>
+          </p:cNvSpPr>
+          <p:nvPr>
+            <p:ph type="title"/>
+          </p:nvPr>
+        </p:nvSpPr>
+        <p:spPr>
+          <a:xfrm>
+            <a:off x="838200" y="0"/>
+            <a:ext cx="10515600" cy="6241009"/>
+          </a:xfrm>
+        </p:spPr>
+        <p:txBody>
+          <a:bodyPr>
+            <a:noAutofit/>
+          </a:bodyPr>
+          <a:lstStyle/>
+          <a:p>
+            <a:r>
+              <a:rPr lang="en-US" sz="1200" dirty="0"/>
+              <a:t>("Mathematical Concepts"[Mesh] OR "Markov Model" OR "Markov models" OR ”Markov chain” OR "Markov chains" )</a:t>
+            </a:r>
+            <a:br>
+              <a:rPr lang="en-US" sz="1200" dirty="0"/>
+            </a:br>
+            <a:r>
+              <a:rPr lang="en-US" sz="1200" dirty="0"/>
+              <a:t>AND</a:t>
+            </a:r>
+            <a:br>
+              <a:rPr lang="en-US" sz="1200" dirty="0"/>
+            </a:br>
+            <a:r>
+              <a:rPr lang="en-US" sz="1200" dirty="0"/>
+              <a:t>("Radiotherapy"[Mesh] OR "radiotherapy" OR "radiation therapy")</a:t>
+            </a:r>
+            <a:br>
+              <a:rPr lang="en-US" sz="1200" dirty="0"/>
+            </a:br>
+            <a:r>
+              <a:rPr lang="en-US" sz="1200" dirty="0"/>
+              <a:t>AND</a:t>
+            </a:r>
+            <a:br>
+              <a:rPr lang="en-US" sz="1200" dirty="0"/>
+            </a:br>
+            <a:r>
+              <a:rPr lang="en-US" sz="1200" dirty="0"/>
+              <a:t>("Clinical Decision-Making"[Mesh] OR "Decision Support Techniques"[Mesh] OR "Decision Support Systems, Clinical"[Mesh] OR</a:t>
+            </a:r>
+            <a:br>
+              <a:rPr lang="en-US" sz="1200" dirty="0"/>
+            </a:br>
+            <a:r>
+              <a:rPr lang="en-US" sz="1200" dirty="0"/>
+              <a:t>"Decision Making"[Mesh] OR "Decision Theory"[Mesh] OR "Clinical Decision Rules"[Mesh] OR "Decision Trees"[Mesh] OR</a:t>
+            </a:r>
+            <a:br>
+              <a:rPr lang="en-US" sz="1200" dirty="0"/>
+            </a:br>
+            <a:r>
+              <a:rPr lang="en-US" sz="1200" dirty="0"/>
+              <a:t>"decision")</a:t>
+            </a:r>
+            <a:br>
+              <a:rPr lang="en-US" sz="1200" dirty="0"/>
+            </a:br>
+            <a:r>
+              <a:rPr lang="en-US" sz="1200" dirty="0"/>
+              <a:t>NOT "Anisotropy"[Mesh]</a:t>
+            </a:r>
+            <a:br>
+              <a:rPr lang="en-US" sz="1200" dirty="0"/>
+            </a:br>
+            <a:r>
+              <a:rPr lang="en-US" sz="1200" dirty="0"/>
+              <a:t>NOT "Artificial Intelligence"[Mesh]</a:t>
+            </a:r>
+            <a:br>
+              <a:rPr lang="en-US" sz="1200" dirty="0"/>
+            </a:br>
+            <a:r>
+              <a:rPr lang="en-US" sz="1200" dirty="0"/>
+              <a:t>NOT "Bionics"[Mesh]</a:t>
+            </a:r>
+            <a:br>
+              <a:rPr lang="en-US" sz="1200" dirty="0"/>
+            </a:br>
+            <a:r>
+              <a:rPr lang="en-US" sz="1200" dirty="0"/>
+              <a:t>NOT "Cells, Cultured"[Mesh]</a:t>
+            </a:r>
+            <a:br>
+              <a:rPr lang="en-US" sz="1200" dirty="0"/>
+            </a:br>
+            <a:r>
+              <a:rPr lang="en-US" sz="1200" dirty="0"/>
+              <a:t>NOT "Clinical Trial"[Publication Type]</a:t>
+            </a:r>
+            <a:br>
+              <a:rPr lang="en-US" sz="1200" dirty="0"/>
+            </a:br>
+            <a:r>
+              <a:rPr lang="en-US" sz="1200" dirty="0"/>
+              <a:t>NOT "Cryopreservation"[Mesh]</a:t>
+            </a:r>
+            <a:br>
+              <a:rPr lang="en-US" sz="1200" dirty="0"/>
+            </a:br>
+            <a:r>
+              <a:rPr lang="en-US" sz="1200" dirty="0"/>
+              <a:t>NOT "Diagnosis, Differential"[Mesh]</a:t>
+            </a:r>
+            <a:br>
+              <a:rPr lang="en-US" sz="1200" dirty="0"/>
+            </a:br>
+            <a:r>
+              <a:rPr lang="en-US" sz="1200" dirty="0"/>
+              <a:t>NOT "Disaster Planning"[Mesh]</a:t>
+            </a:r>
+            <a:br>
+              <a:rPr lang="en-US" sz="1200" dirty="0"/>
+            </a:br>
+            <a:r>
+              <a:rPr lang="en-US" sz="1200" dirty="0"/>
+              <a:t>NOT "DNA"[Mesh]</a:t>
+            </a:r>
+            <a:br>
+              <a:rPr lang="en-US" sz="1200" dirty="0"/>
+            </a:br>
+            <a:r>
+              <a:rPr lang="en-US" sz="1200" dirty="0"/>
+              <a:t>NOT "Legal Case"[Publication Type]</a:t>
+            </a:r>
+            <a:br>
+              <a:rPr lang="en-US" sz="1200" dirty="0"/>
+            </a:br>
+            <a:r>
+              <a:rPr lang="en-US" sz="1200" dirty="0"/>
+              <a:t>NOT "Machine Learning"[Mesh]</a:t>
+            </a:r>
+            <a:br>
+              <a:rPr lang="en-US" sz="1200" dirty="0"/>
+            </a:br>
+            <a:r>
+              <a:rPr lang="en-US" sz="1200" dirty="0"/>
+              <a:t>NOT "Meta-Analysis" [Publication Type]</a:t>
+            </a:r>
+            <a:br>
+              <a:rPr lang="en-US" sz="1200" dirty="0"/>
+            </a:br>
+            <a:r>
+              <a:rPr lang="en-US" sz="1200" dirty="0"/>
+              <a:t>NOT "Observational Study"[Publication Type]</a:t>
+            </a:r>
+            <a:br>
+              <a:rPr lang="en-US" sz="1200" dirty="0"/>
+            </a:br>
+            <a:r>
+              <a:rPr lang="en-US" sz="1200" dirty="0"/>
+              <a:t>NOT "Patient Positioning"[Mesh]</a:t>
+            </a:r>
+            <a:br>
+              <a:rPr lang="en-US" sz="1200" dirty="0"/>
+            </a:br>
+            <a:r>
+              <a:rPr lang="en-US" sz="1200" dirty="0"/>
+              <a:t>NOT "Prognosis"[Mesh]</a:t>
+            </a:r>
+            <a:br>
+              <a:rPr lang="en-US" sz="1200" dirty="0"/>
+            </a:br>
+            <a:r>
+              <a:rPr lang="en-US" sz="1200" dirty="0"/>
+              <a:t>NOT "Phantoms, Imaging"[Mesh]</a:t>
+            </a:r>
+            <a:br>
+              <a:rPr lang="en-US" sz="1200" dirty="0"/>
+            </a:br>
+            <a:r>
+              <a:rPr lang="en-US" sz="1200" dirty="0"/>
+              <a:t>NOT "Radiation Protection"[Mesh]</a:t>
+            </a:r>
+            <a:br>
+              <a:rPr lang="en-US" sz="1200" dirty="0"/>
+            </a:br>
+            <a:r>
+              <a:rPr lang="en-US" sz="1200" dirty="0"/>
+              <a:t>NOT "Radiology, Interventional"[Mesh]</a:t>
+            </a:r>
+            <a:br>
+              <a:rPr lang="en-US" sz="1200" dirty="0"/>
+            </a:br>
+            <a:r>
+              <a:rPr lang="en-US" sz="1200" dirty="0"/>
+              <a:t>NOT "Radiometry"[Mesh]</a:t>
+            </a:r>
+            <a:br>
+              <a:rPr lang="en-US" sz="1200" dirty="0"/>
+            </a:br>
+            <a:r>
+              <a:rPr lang="en-US" sz="1200" dirty="0"/>
+              <a:t>NOT "Radiotherapy Planning, Computer-Assisted"[Mesh]</a:t>
+            </a:r>
+            <a:br>
+              <a:rPr lang="en-US" sz="1200" dirty="0"/>
+            </a:br>
+            <a:r>
+              <a:rPr lang="en-US" sz="1200" dirty="0"/>
+              <a:t>NOT "Radiotherapy Setup Errors"[Mesh]</a:t>
+            </a:r>
+            <a:br>
+              <a:rPr lang="en-US" sz="1200" dirty="0"/>
+            </a:br>
+            <a:r>
+              <a:rPr lang="en-US" sz="1200" dirty="0"/>
+              <a:t>NOT "Retrospective Studies"[Mesh]</a:t>
+            </a:r>
+            <a:br>
+              <a:rPr lang="en-US" sz="1200" dirty="0"/>
+            </a:br>
+            <a:r>
+              <a:rPr lang="en-US" sz="1200" dirty="0"/>
+              <a:t>NOT "Software"[Mesh]</a:t>
+            </a:r>
+            <a:br>
+              <a:rPr lang="en-US" sz="1200" dirty="0"/>
+            </a:br>
+            <a:r>
+              <a:rPr lang="en-US" sz="1200" dirty="0"/>
+              <a:t>NOT "Survival Analysis"[Mesh]</a:t>
+            </a:r>
+            <a:br>
+              <a:rPr lang="en-US" sz="1200" dirty="0"/>
+            </a:br>
+            <a:r>
+              <a:rPr lang="en-US" sz="1200" dirty="0"/>
+              <a:t>NOT "Quality Assurance, Health Care"[Mesh]</a:t>
+            </a:r>
+            <a:br>
+              <a:rPr lang="en-US" sz="1200" dirty="0"/>
+            </a:br>
+            <a:r>
+              <a:rPr lang="en-US" sz="1200" dirty="0"/>
+              <a:t>NOT "Quality Control"[Mesh]</a:t>
+            </a:r>
+            <a:br>
+              <a:rPr lang="en-US" sz="1200" dirty="0"/>
+            </a:br>
+            <a:r>
+              <a:rPr lang="en-US" sz="1200" dirty="0"/>
+              <a:t>NOT "Uncertainty"[Mesh]</a:t>
+            </a:r>
+            <a:br>
+              <a:rPr lang="en-US" sz="1200" dirty="0"/>
+            </a:br>
+            <a:r>
+              <a:rPr lang="en-US" sz="1200" dirty="0"/>
+              <a:t>AND "English" [LA]</a:t>
+            </a:r>
+            <a:br>
+              <a:rPr lang="en-US" sz="1200" dirty="0"/>
+            </a:br>
+            <a:r>
+              <a:rPr lang="en-US" sz="1200" dirty="0"/>
+              <a:t>AND 2000:2022[</a:t>
+            </a:r>
+            <a:r>
+              <a:rPr lang="en-US" sz="1200" dirty="0" err="1"/>
+              <a:t>dp</a:t>
+            </a:r>
+            <a:r>
+              <a:rPr lang="en-US" sz="1200" dirty="0"/>
+              <a:t>]</a:t>
+            </a:r>
+          </a:p>
+        </p:txBody>
+      </p:sp>
+      <p:sp>
+        <p:nvSpPr>
+          <p:cNvPr id="3" name="Content Placeholder 2">
+            <a:extLst>
+              <a:ext uri="{FF2B5EF4-FFF2-40B4-BE49-F238E27FC236}">
+                <a16:creationId xmlns:a16="http://schemas.microsoft.com/office/drawing/2014/main" id="{43BB1DA0-5C2C-3D42-9701-B21381A6ECC9}"/>
+              </a:ext>
+            </a:extLst>
+          </p:cNvPr>
+          <p:cNvSpPr>
+            <a:spLocks noGrp="1"/>
+          </p:cNvSpPr>
+          <p:nvPr>
+            <p:ph idx="1"/>
+          </p:nvPr>
+        </p:nvSpPr>
+        <p:spPr>
+          <a:xfrm>
+            <a:off x="838200" y="6241009"/>
+            <a:ext cx="10515600" cy="616991"/>
+          </a:xfrm>
+        </p:spPr>
+        <p:txBody>
+          <a:bodyPr/>
+          <a:lstStyle/>
+          <a:p>
+            <a:pPr marL="0" indent="0" algn="ctr">
+              <a:buNone/>
+            </a:pPr>
+            <a:r>
+              <a:rPr lang="en-US" dirty="0"/>
+              <a:t>N = 209</a:t>
+            </a:r>
+          </a:p>
+        </p:txBody>
+      </p:sp>
+    </p:spTree>
+    <p:extLst>
+      <p:ext uri="{BB962C8B-B14F-4D97-AF65-F5344CB8AC3E}">
+        <p14:creationId xmlns:p14="http://schemas.microsoft.com/office/powerpoint/2010/main" val="2073818108"/>
+      </p:ext>
+    </p:extLst>
+  </p:cSld>
+  <p:clrMapOvr>
+    <a:masterClrMapping/>
+  </p:clrMapOvr>
+</p:sld>
+</file>
+
+<file path=ppt/slides/slide15.xml><?xml version="1.0" encoding="utf-8"?>
+<p:sld xmlns:a="http://schemas.openxmlformats.org/drawingml/2006/main" xmlns:r="http://schemas.openxmlformats.org/officeDocument/2006/relationships" xmlns:p="http://schemas.openxmlformats.org/presentationml/2006/main">
+  <p:cSld>
+    <p:spTree>
+      <p:nvGrpSpPr>
+        <p:cNvPr id="1" name=""/>
+        <p:cNvGrpSpPr/>
+        <p:nvPr/>
+      </p:nvGrpSpPr>
+      <p:grpSpPr>
+        <a:xfrm>
+          <a:off x="0" y="0"/>
+          <a:ext cx="0" cy="0"/>
+          <a:chOff x="0" y="0"/>
+          <a:chExt cx="0" cy="0"/>
+        </a:xfrm>
+      </p:grpSpPr>
+      <p:sp>
+        <p:nvSpPr>
+          <p:cNvPr id="2" name="Title 1">
+            <a:extLst>
+              <a:ext uri="{FF2B5EF4-FFF2-40B4-BE49-F238E27FC236}">
+                <a16:creationId xmlns:a16="http://schemas.microsoft.com/office/drawing/2014/main" id="{6D804DAD-F4D2-EB48-9443-47E91A94D708}"/>
+              </a:ext>
+            </a:extLst>
+          </p:cNvPr>
+          <p:cNvSpPr>
+            <a:spLocks noGrp="1"/>
+          </p:cNvSpPr>
+          <p:nvPr>
+            <p:ph type="title"/>
+          </p:nvPr>
+        </p:nvSpPr>
+        <p:spPr>
+          <a:xfrm>
+            <a:off x="838200" y="0"/>
+            <a:ext cx="10515600" cy="6241009"/>
+          </a:xfrm>
+        </p:spPr>
+        <p:txBody>
+          <a:bodyPr>
+            <a:noAutofit/>
+          </a:bodyPr>
+          <a:lstStyle/>
+          <a:p>
+            <a:r>
+              <a:rPr lang="en-US" sz="1200" dirty="0"/>
+              <a:t>("Mathematical Concepts"[Mesh] OR "stochastic process” OR "stochastic processes")</a:t>
+            </a:r>
+            <a:br>
+              <a:rPr lang="en-US" sz="1200" dirty="0"/>
+            </a:br>
+            <a:r>
+              <a:rPr lang="en-US" sz="1200" dirty="0"/>
+              <a:t>AND</a:t>
+            </a:r>
+            <a:br>
+              <a:rPr lang="en-US" sz="1200" dirty="0"/>
+            </a:br>
+            <a:r>
+              <a:rPr lang="en-US" sz="1200" dirty="0"/>
+              <a:t>("Radiotherapy"[Mesh] OR "radiotherapy" OR "radiation therapy")</a:t>
+            </a:r>
+            <a:br>
+              <a:rPr lang="en-US" sz="1200" dirty="0"/>
+            </a:br>
+            <a:r>
+              <a:rPr lang="en-US" sz="1200" dirty="0"/>
+              <a:t>AND</a:t>
+            </a:r>
+            <a:br>
+              <a:rPr lang="en-US" sz="1200" dirty="0"/>
+            </a:br>
+            <a:r>
+              <a:rPr lang="en-US" sz="1200" dirty="0"/>
+              <a:t>("Clinical Decision-Making"[Mesh] OR "Decision Support Techniques"[Mesh] OR "Decision Support Systems, Clinical"[Mesh] OR</a:t>
+            </a:r>
+            <a:br>
+              <a:rPr lang="en-US" sz="1200" dirty="0"/>
+            </a:br>
+            <a:r>
+              <a:rPr lang="en-US" sz="1200" dirty="0"/>
+              <a:t>"Decision Making"[Mesh] OR "Decision Theory"[Mesh] OR "Clinical Decision Rules"[Mesh] OR "Decision Trees"[Mesh] OR</a:t>
+            </a:r>
+            <a:br>
+              <a:rPr lang="en-US" sz="1200" dirty="0"/>
+            </a:br>
+            <a:r>
+              <a:rPr lang="en-US" sz="1200" dirty="0"/>
+              <a:t>"decision")</a:t>
+            </a:r>
+            <a:br>
+              <a:rPr lang="en-US" sz="1200" dirty="0"/>
+            </a:br>
+            <a:r>
+              <a:rPr lang="en-US" sz="1200" dirty="0"/>
+              <a:t>NOT "Anisotropy"[Mesh]</a:t>
+            </a:r>
+            <a:br>
+              <a:rPr lang="en-US" sz="1200" dirty="0"/>
+            </a:br>
+            <a:r>
+              <a:rPr lang="en-US" sz="1200" dirty="0"/>
+              <a:t>NOT "Artificial Intelligence"[Mesh]</a:t>
+            </a:r>
+            <a:br>
+              <a:rPr lang="en-US" sz="1200" dirty="0"/>
+            </a:br>
+            <a:r>
+              <a:rPr lang="en-US" sz="1200" dirty="0"/>
+              <a:t>NOT "Bionics"[Mesh]</a:t>
+            </a:r>
+            <a:br>
+              <a:rPr lang="en-US" sz="1200" dirty="0"/>
+            </a:br>
+            <a:r>
+              <a:rPr lang="en-US" sz="1200" dirty="0"/>
+              <a:t>NOT "Cells, Cultured"[Mesh]</a:t>
+            </a:r>
+            <a:br>
+              <a:rPr lang="en-US" sz="1200" dirty="0"/>
+            </a:br>
+            <a:r>
+              <a:rPr lang="en-US" sz="1200" dirty="0"/>
+              <a:t>NOT "Clinical Trial"[Publication Type]</a:t>
+            </a:r>
+            <a:br>
+              <a:rPr lang="en-US" sz="1200" dirty="0"/>
+            </a:br>
+            <a:r>
+              <a:rPr lang="en-US" sz="1200" dirty="0"/>
+              <a:t>NOT "Cryopreservation"[Mesh]</a:t>
+            </a:r>
+            <a:br>
+              <a:rPr lang="en-US" sz="1200" dirty="0"/>
+            </a:br>
+            <a:r>
+              <a:rPr lang="en-US" sz="1200" dirty="0"/>
+              <a:t>NOT "Diagnosis, Differential"[Mesh]</a:t>
+            </a:r>
+            <a:br>
+              <a:rPr lang="en-US" sz="1200" dirty="0"/>
+            </a:br>
+            <a:r>
+              <a:rPr lang="en-US" sz="1200" dirty="0"/>
+              <a:t>NOT "Disaster Planning"[Mesh]</a:t>
+            </a:r>
+            <a:br>
+              <a:rPr lang="en-US" sz="1200" dirty="0"/>
+            </a:br>
+            <a:r>
+              <a:rPr lang="en-US" sz="1200" dirty="0"/>
+              <a:t>NOT "DNA"[Mesh]</a:t>
+            </a:r>
+            <a:br>
+              <a:rPr lang="en-US" sz="1200" dirty="0"/>
+            </a:br>
+            <a:r>
+              <a:rPr lang="en-US" sz="1200" dirty="0"/>
+              <a:t>NOT "Legal Case"[Publication Type]</a:t>
+            </a:r>
+            <a:br>
+              <a:rPr lang="en-US" sz="1200" dirty="0"/>
+            </a:br>
+            <a:r>
+              <a:rPr lang="en-US" sz="1200" dirty="0"/>
+              <a:t>NOT "Machine Learning"[Mesh]</a:t>
+            </a:r>
+            <a:br>
+              <a:rPr lang="en-US" sz="1200" dirty="0"/>
+            </a:br>
+            <a:r>
+              <a:rPr lang="en-US" sz="1200" dirty="0"/>
+              <a:t>NOT "Meta-Analysis" [Publication Type]</a:t>
+            </a:r>
+            <a:br>
+              <a:rPr lang="en-US" sz="1200" dirty="0"/>
+            </a:br>
+            <a:r>
+              <a:rPr lang="en-US" sz="1200" dirty="0"/>
+              <a:t>NOT "Observational Study"[Publication Type]</a:t>
+            </a:r>
+            <a:br>
+              <a:rPr lang="en-US" sz="1200" dirty="0"/>
+            </a:br>
+            <a:r>
+              <a:rPr lang="en-US" sz="1200" dirty="0"/>
+              <a:t>NOT "Patient Positioning"[Mesh]</a:t>
+            </a:r>
+            <a:br>
+              <a:rPr lang="en-US" sz="1200" dirty="0"/>
+            </a:br>
+            <a:r>
+              <a:rPr lang="en-US" sz="1200" dirty="0"/>
+              <a:t>NOT "Prognosis"[Mesh]</a:t>
+            </a:r>
+            <a:br>
+              <a:rPr lang="en-US" sz="1200" dirty="0"/>
+            </a:br>
+            <a:r>
+              <a:rPr lang="en-US" sz="1200" dirty="0"/>
+              <a:t>NOT "Phantoms, Imaging"[Mesh]</a:t>
+            </a:r>
+            <a:br>
+              <a:rPr lang="en-US" sz="1200" dirty="0"/>
+            </a:br>
+            <a:r>
+              <a:rPr lang="en-US" sz="1200" dirty="0"/>
+              <a:t>NOT "Radiation Protection"[Mesh]</a:t>
+            </a:r>
+            <a:br>
+              <a:rPr lang="en-US" sz="1200" dirty="0"/>
+            </a:br>
+            <a:r>
+              <a:rPr lang="en-US" sz="1200" dirty="0"/>
+              <a:t>NOT "Radiology, Interventional"[Mesh]</a:t>
+            </a:r>
+            <a:br>
+              <a:rPr lang="en-US" sz="1200" dirty="0"/>
+            </a:br>
+            <a:r>
+              <a:rPr lang="en-US" sz="1200" dirty="0"/>
+              <a:t>NOT "Radiometry"[Mesh]</a:t>
+            </a:r>
+            <a:br>
+              <a:rPr lang="en-US" sz="1200" dirty="0"/>
+            </a:br>
+            <a:r>
+              <a:rPr lang="en-US" sz="1200" dirty="0"/>
+              <a:t>NOT "Radiotherapy Planning, Computer-Assisted"[Mesh]</a:t>
+            </a:r>
+            <a:br>
+              <a:rPr lang="en-US" sz="1200" dirty="0"/>
+            </a:br>
+            <a:r>
+              <a:rPr lang="en-US" sz="1200" dirty="0"/>
+              <a:t>NOT "Radiotherapy Setup Errors"[Mesh]</a:t>
+            </a:r>
+            <a:br>
+              <a:rPr lang="en-US" sz="1200" dirty="0"/>
+            </a:br>
+            <a:r>
+              <a:rPr lang="en-US" sz="1200" dirty="0"/>
+              <a:t>NOT "Retrospective Studies"[Mesh]</a:t>
+            </a:r>
+            <a:br>
+              <a:rPr lang="en-US" sz="1200" dirty="0"/>
+            </a:br>
+            <a:r>
+              <a:rPr lang="en-US" sz="1200" dirty="0"/>
+              <a:t>NOT "Software"[Mesh]</a:t>
+            </a:r>
+            <a:br>
+              <a:rPr lang="en-US" sz="1200" dirty="0"/>
+            </a:br>
+            <a:r>
+              <a:rPr lang="en-US" sz="1200" dirty="0"/>
+              <a:t>NOT "Survival Analysis"[Mesh]</a:t>
+            </a:r>
+            <a:br>
+              <a:rPr lang="en-US" sz="1200" dirty="0"/>
+            </a:br>
+            <a:r>
+              <a:rPr lang="en-US" sz="1200" dirty="0"/>
+              <a:t>NOT "Quality Assurance, Health Care"[Mesh]</a:t>
+            </a:r>
+            <a:br>
+              <a:rPr lang="en-US" sz="1200" dirty="0"/>
+            </a:br>
+            <a:r>
+              <a:rPr lang="en-US" sz="1200" dirty="0"/>
+              <a:t>NOT "Quality Control"[Mesh]</a:t>
+            </a:r>
+            <a:br>
+              <a:rPr lang="en-US" sz="1200" dirty="0"/>
+            </a:br>
+            <a:r>
+              <a:rPr lang="en-US" sz="1200" dirty="0"/>
+              <a:t>NOT "Uncertainty"[Mesh]</a:t>
+            </a:r>
+            <a:br>
+              <a:rPr lang="en-US" sz="1200" dirty="0"/>
+            </a:br>
+            <a:r>
+              <a:rPr lang="en-US" sz="1200" dirty="0"/>
+              <a:t>AND "English" [LA]</a:t>
+            </a:r>
+            <a:br>
+              <a:rPr lang="en-US" sz="1200" dirty="0"/>
+            </a:br>
+            <a:r>
+              <a:rPr lang="en-US" sz="1200" dirty="0"/>
+              <a:t>AND 2000:2022[</a:t>
+            </a:r>
+            <a:r>
+              <a:rPr lang="en-US" sz="1200" dirty="0" err="1"/>
+              <a:t>dp</a:t>
+            </a:r>
+            <a:r>
+              <a:rPr lang="en-US" sz="1200" dirty="0"/>
+              <a:t>]</a:t>
+            </a:r>
+          </a:p>
+        </p:txBody>
+      </p:sp>
+      <p:sp>
+        <p:nvSpPr>
+          <p:cNvPr id="3" name="Content Placeholder 2">
+            <a:extLst>
+              <a:ext uri="{FF2B5EF4-FFF2-40B4-BE49-F238E27FC236}">
+                <a16:creationId xmlns:a16="http://schemas.microsoft.com/office/drawing/2014/main" id="{43BB1DA0-5C2C-3D42-9701-B21381A6ECC9}"/>
+              </a:ext>
+            </a:extLst>
+          </p:cNvPr>
+          <p:cNvSpPr>
+            <a:spLocks noGrp="1"/>
+          </p:cNvSpPr>
+          <p:nvPr>
+            <p:ph idx="1"/>
+          </p:nvPr>
+        </p:nvSpPr>
+        <p:spPr>
+          <a:xfrm>
+            <a:off x="838200" y="6241009"/>
+            <a:ext cx="10515600" cy="616991"/>
+          </a:xfrm>
+        </p:spPr>
+        <p:txBody>
+          <a:bodyPr/>
+          <a:lstStyle/>
+          <a:p>
+            <a:pPr marL="0" indent="0" algn="ctr">
+              <a:buNone/>
+            </a:pPr>
+            <a:r>
+              <a:rPr lang="en-US" dirty="0"/>
+              <a:t>N = 196</a:t>
+            </a:r>
+          </a:p>
+        </p:txBody>
+      </p:sp>
+    </p:spTree>
+    <p:extLst>
+      <p:ext uri="{BB962C8B-B14F-4D97-AF65-F5344CB8AC3E}">
+        <p14:creationId xmlns:p14="http://schemas.microsoft.com/office/powerpoint/2010/main" val="3225534254"/>
+      </p:ext>
+    </p:extLst>
+  </p:cSld>
+  <p:clrMapOvr>
+    <a:masterClrMapping/>
+  </p:clrMapOvr>
+</p:sld>
+</file>
+
+<file path=ppt/slides/slide16.xml><?xml version="1.0" encoding="utf-8"?>
+<p:sld xmlns:a="http://schemas.openxmlformats.org/drawingml/2006/main" xmlns:r="http://schemas.openxmlformats.org/officeDocument/2006/relationships" xmlns:p="http://schemas.openxmlformats.org/presentationml/2006/main">
+  <p:cSld>
+    <p:spTree>
+      <p:nvGrpSpPr>
+        <p:cNvPr id="1" name=""/>
+        <p:cNvGrpSpPr/>
+        <p:nvPr/>
+      </p:nvGrpSpPr>
+      <p:grpSpPr>
+        <a:xfrm>
+          <a:off x="0" y="0"/>
+          <a:ext cx="0" cy="0"/>
+          <a:chOff x="0" y="0"/>
+          <a:chExt cx="0" cy="0"/>
+        </a:xfrm>
+      </p:grpSpPr>
+      <p:sp>
+        <p:nvSpPr>
+          <p:cNvPr id="2" name="Title 1">
+            <a:extLst>
+              <a:ext uri="{FF2B5EF4-FFF2-40B4-BE49-F238E27FC236}">
+                <a16:creationId xmlns:a16="http://schemas.microsoft.com/office/drawing/2014/main" id="{6D804DAD-F4D2-EB48-9443-47E91A94D708}"/>
+              </a:ext>
+            </a:extLst>
+          </p:cNvPr>
+          <p:cNvSpPr>
+            <a:spLocks noGrp="1"/>
+          </p:cNvSpPr>
+          <p:nvPr>
+            <p:ph type="title"/>
+          </p:nvPr>
+        </p:nvSpPr>
+        <p:spPr>
+          <a:xfrm>
+            <a:off x="838200" y="0"/>
+            <a:ext cx="10515600" cy="6241009"/>
+          </a:xfrm>
+        </p:spPr>
+        <p:txBody>
+          <a:bodyPr>
+            <a:noAutofit/>
+          </a:bodyPr>
+          <a:lstStyle/>
+          <a:p>
+            <a:r>
+              <a:rPr lang="en-US" sz="1200" dirty="0"/>
+              <a:t>("Stochastic Processes"[Mesh] OR "Operations Research"[Mesh] OR "operations research" OR "operational research" OR "Markov Model" OR "Markov models" OR "Markov chain" OR "Markov chains")</a:t>
+            </a:r>
+            <a:br>
+              <a:rPr lang="en-US" sz="1200" dirty="0"/>
+            </a:br>
+            <a:r>
+              <a:rPr lang="en-US" sz="1200" dirty="0"/>
+              <a:t>AND</a:t>
+            </a:r>
+            <a:br>
+              <a:rPr lang="en-US" sz="1200" dirty="0"/>
+            </a:br>
+            <a:r>
+              <a:rPr lang="en-US" sz="1200" dirty="0"/>
+              <a:t>("Radiotherapy"[Mesh] OR "radiotherapy" OR "radiation therapy")</a:t>
+            </a:r>
+            <a:br>
+              <a:rPr lang="en-US" sz="1200" dirty="0"/>
+            </a:br>
+            <a:r>
+              <a:rPr lang="en-US" sz="1200" dirty="0"/>
+              <a:t>AND</a:t>
+            </a:r>
+            <a:br>
+              <a:rPr lang="en-US" sz="1200" dirty="0"/>
+            </a:br>
+            <a:r>
+              <a:rPr lang="en-US" sz="1200" dirty="0"/>
+              <a:t>("Clinical Decision-Making"[Mesh] OR "Decision Support Techniques"[Mesh] OR "Decision Support Systems, Clinical"[Mesh] OR</a:t>
+            </a:r>
+            <a:br>
+              <a:rPr lang="en-US" sz="1200" dirty="0"/>
+            </a:br>
+            <a:r>
+              <a:rPr lang="en-US" sz="1200" dirty="0"/>
+              <a:t>"Decision Making"[Mesh] OR "Decision Theory"[Mesh] OR "Clinical Decision Rules"[Mesh] OR "Decision Trees"[Mesh] OR</a:t>
+            </a:r>
+            <a:br>
+              <a:rPr lang="en-US" sz="1200" dirty="0"/>
+            </a:br>
+            <a:r>
+              <a:rPr lang="en-US" sz="1200" dirty="0"/>
+              <a:t>"decision")</a:t>
+            </a:r>
+            <a:br>
+              <a:rPr lang="en-US" sz="1200" dirty="0"/>
+            </a:br>
+            <a:r>
+              <a:rPr lang="en-US" sz="1200" dirty="0"/>
+              <a:t>NOT "Anisotropy"[Mesh]</a:t>
+            </a:r>
+            <a:br>
+              <a:rPr lang="en-US" sz="1200" dirty="0"/>
+            </a:br>
+            <a:r>
+              <a:rPr lang="en-US" sz="1200" dirty="0"/>
+              <a:t>NOT "Artificial Intelligence"[Mesh]</a:t>
+            </a:r>
+            <a:br>
+              <a:rPr lang="en-US" sz="1200" dirty="0"/>
+            </a:br>
+            <a:r>
+              <a:rPr lang="en-US" sz="1200" dirty="0"/>
+              <a:t>NOT "Bionics"[Mesh]</a:t>
+            </a:r>
+            <a:br>
+              <a:rPr lang="en-US" sz="1200" dirty="0"/>
+            </a:br>
+            <a:r>
+              <a:rPr lang="en-US" sz="1200" dirty="0"/>
+              <a:t>NOT "Cells, Cultured"[Mesh]</a:t>
+            </a:r>
+            <a:br>
+              <a:rPr lang="en-US" sz="1200" dirty="0"/>
+            </a:br>
+            <a:r>
+              <a:rPr lang="en-US" sz="1200" dirty="0"/>
+              <a:t>NOT "Clinical Trial"[Publication Type]</a:t>
+            </a:r>
+            <a:br>
+              <a:rPr lang="en-US" sz="1200" dirty="0"/>
+            </a:br>
+            <a:r>
+              <a:rPr lang="en-US" sz="1200" dirty="0"/>
+              <a:t>NOT "Cryopreservation"[Mesh]</a:t>
+            </a:r>
+            <a:br>
+              <a:rPr lang="en-US" sz="1200" dirty="0"/>
+            </a:br>
+            <a:r>
+              <a:rPr lang="en-US" sz="1200" dirty="0"/>
+              <a:t>NOT "Diagnosis, Differential"[Mesh]</a:t>
+            </a:r>
+            <a:br>
+              <a:rPr lang="en-US" sz="1200" dirty="0"/>
+            </a:br>
+            <a:r>
+              <a:rPr lang="en-US" sz="1200" dirty="0"/>
+              <a:t>NOT "Disaster Planning"[Mesh]</a:t>
+            </a:r>
+            <a:br>
+              <a:rPr lang="en-US" sz="1200" dirty="0"/>
+            </a:br>
+            <a:r>
+              <a:rPr lang="en-US" sz="1200" dirty="0"/>
+              <a:t>NOT "DNA"[Mesh]</a:t>
+            </a:r>
+            <a:br>
+              <a:rPr lang="en-US" sz="1200" dirty="0"/>
+            </a:br>
+            <a:r>
+              <a:rPr lang="en-US" sz="1200" dirty="0"/>
+              <a:t>NOT "Legal Case"[Publication Type]</a:t>
+            </a:r>
+            <a:br>
+              <a:rPr lang="en-US" sz="1200" dirty="0"/>
+            </a:br>
+            <a:r>
+              <a:rPr lang="en-US" sz="1200" dirty="0"/>
+              <a:t>NOT "Machine Learning"[Mesh]</a:t>
+            </a:r>
+            <a:br>
+              <a:rPr lang="en-US" sz="1200" dirty="0"/>
+            </a:br>
+            <a:r>
+              <a:rPr lang="en-US" sz="1200" dirty="0"/>
+              <a:t>NOT "Meta-Analysis" [Publication Type]</a:t>
+            </a:r>
+            <a:br>
+              <a:rPr lang="en-US" sz="1200" dirty="0"/>
+            </a:br>
+            <a:r>
+              <a:rPr lang="en-US" sz="1200" dirty="0"/>
+              <a:t>NOT "Observational Study"[Publication Type]</a:t>
+            </a:r>
+            <a:br>
+              <a:rPr lang="en-US" sz="1200" dirty="0"/>
+            </a:br>
+            <a:r>
+              <a:rPr lang="en-US" sz="1200" dirty="0"/>
+              <a:t>NOT "Patient Positioning"[Mesh]</a:t>
+            </a:r>
+            <a:br>
+              <a:rPr lang="en-US" sz="1200" dirty="0"/>
+            </a:br>
+            <a:r>
+              <a:rPr lang="en-US" sz="1200" dirty="0"/>
+              <a:t>NOT "Prognosis"[Mesh]</a:t>
+            </a:r>
+            <a:br>
+              <a:rPr lang="en-US" sz="1200" dirty="0"/>
+            </a:br>
+            <a:r>
+              <a:rPr lang="en-US" sz="1200" dirty="0"/>
+              <a:t>NOT "Phantoms, Imaging"[Mesh]</a:t>
+            </a:r>
+            <a:br>
+              <a:rPr lang="en-US" sz="1200" dirty="0"/>
+            </a:br>
+            <a:r>
+              <a:rPr lang="en-US" sz="1200" dirty="0"/>
+              <a:t>NOT "Radiation Protection"[Mesh]</a:t>
+            </a:r>
+            <a:br>
+              <a:rPr lang="en-US" sz="1200" dirty="0"/>
+            </a:br>
+            <a:r>
+              <a:rPr lang="en-US" sz="1200" dirty="0"/>
+              <a:t>NOT "Radiology, Interventional"[Mesh]</a:t>
+            </a:r>
+            <a:br>
+              <a:rPr lang="en-US" sz="1200" dirty="0"/>
+            </a:br>
+            <a:r>
+              <a:rPr lang="en-US" sz="1200" dirty="0"/>
+              <a:t>NOT "Radiometry"[Mesh]</a:t>
+            </a:r>
+            <a:br>
+              <a:rPr lang="en-US" sz="1200" dirty="0"/>
+            </a:br>
+            <a:r>
+              <a:rPr lang="en-US" sz="1200" dirty="0"/>
+              <a:t>NOT "Radiotherapy Planning, Computer-Assisted"[Mesh]</a:t>
+            </a:r>
+            <a:br>
+              <a:rPr lang="en-US" sz="1200" dirty="0"/>
+            </a:br>
+            <a:r>
+              <a:rPr lang="en-US" sz="1200" dirty="0"/>
+              <a:t>NOT "Radiotherapy Setup Errors"[Mesh]</a:t>
+            </a:r>
+            <a:br>
+              <a:rPr lang="en-US" sz="1200" dirty="0"/>
+            </a:br>
+            <a:r>
+              <a:rPr lang="en-US" sz="1200" dirty="0"/>
+              <a:t>NOT "Retrospective Studies"[Mesh]</a:t>
+            </a:r>
+            <a:br>
+              <a:rPr lang="en-US" sz="1200" dirty="0"/>
+            </a:br>
+            <a:r>
+              <a:rPr lang="en-US" sz="1200" dirty="0"/>
+              <a:t>NOT "Software"[Mesh]</a:t>
+            </a:r>
+            <a:br>
+              <a:rPr lang="en-US" sz="1200" dirty="0"/>
+            </a:br>
+            <a:r>
+              <a:rPr lang="en-US" sz="1200" dirty="0"/>
+              <a:t>NOT "Survival Analysis"[Mesh]</a:t>
+            </a:r>
+            <a:br>
+              <a:rPr lang="en-US" sz="1200" dirty="0"/>
+            </a:br>
+            <a:r>
+              <a:rPr lang="en-US" sz="1200" dirty="0"/>
+              <a:t>NOT "Quality Assurance, Health Care"[Mesh]</a:t>
+            </a:r>
+            <a:br>
+              <a:rPr lang="en-US" sz="1200" dirty="0"/>
+            </a:br>
+            <a:r>
+              <a:rPr lang="en-US" sz="1200" dirty="0"/>
+              <a:t>NOT "Quality Control"[Mesh]</a:t>
+            </a:r>
+            <a:br>
+              <a:rPr lang="en-US" sz="1200" dirty="0"/>
+            </a:br>
+            <a:r>
+              <a:rPr lang="en-US" sz="1200" dirty="0"/>
+              <a:t>NOT "Uncertainty"[Mesh]</a:t>
+            </a:r>
+            <a:br>
+              <a:rPr lang="en-US" sz="1200" dirty="0"/>
+            </a:br>
+            <a:r>
+              <a:rPr lang="en-US" sz="1200" dirty="0"/>
+              <a:t>AND "English" [LA]</a:t>
+            </a:r>
+            <a:br>
+              <a:rPr lang="en-US" sz="1200" dirty="0"/>
+            </a:br>
+            <a:r>
+              <a:rPr lang="en-US" sz="1200" dirty="0"/>
+              <a:t>AND 2000:2022[</a:t>
+            </a:r>
+            <a:r>
+              <a:rPr lang="en-US" sz="1200" dirty="0" err="1"/>
+              <a:t>dp</a:t>
+            </a:r>
+            <a:r>
+              <a:rPr lang="en-US" sz="1200" dirty="0"/>
+              <a:t>]</a:t>
+            </a:r>
+          </a:p>
+        </p:txBody>
+      </p:sp>
+      <p:sp>
+        <p:nvSpPr>
+          <p:cNvPr id="3" name="Content Placeholder 2">
+            <a:extLst>
+              <a:ext uri="{FF2B5EF4-FFF2-40B4-BE49-F238E27FC236}">
+                <a16:creationId xmlns:a16="http://schemas.microsoft.com/office/drawing/2014/main" id="{43BB1DA0-5C2C-3D42-9701-B21381A6ECC9}"/>
+              </a:ext>
+            </a:extLst>
+          </p:cNvPr>
+          <p:cNvSpPr>
+            <a:spLocks noGrp="1"/>
+          </p:cNvSpPr>
+          <p:nvPr>
+            <p:ph idx="1"/>
+          </p:nvPr>
+        </p:nvSpPr>
+        <p:spPr>
+          <a:xfrm>
+            <a:off x="838200" y="6241009"/>
+            <a:ext cx="10515600" cy="616991"/>
+          </a:xfrm>
+        </p:spPr>
+        <p:txBody>
+          <a:bodyPr/>
+          <a:lstStyle/>
+          <a:p>
+            <a:pPr marL="0" indent="0" algn="ctr">
+              <a:buNone/>
+            </a:pPr>
+            <a:r>
+              <a:rPr lang="en-US" dirty="0"/>
+              <a:t>N = 54</a:t>
+            </a:r>
+          </a:p>
+        </p:txBody>
+      </p:sp>
+    </p:spTree>
+    <p:extLst>
+      <p:ext uri="{BB962C8B-B14F-4D97-AF65-F5344CB8AC3E}">
+        <p14:creationId xmlns:p14="http://schemas.microsoft.com/office/powerpoint/2010/main" val="3013138370"/>
+      </p:ext>
+    </p:extLst>
+  </p:cSld>
+  <p:clrMapOvr>
+    <a:masterClrMapping/>
+  </p:clrMapOvr>
+</p:sld>
+</file>
+
+<file path=ppt/slides/slide2.xml><?xml version="1.0" encoding="utf-8"?>
+<p:sld xmlns:a="http://schemas.openxmlformats.org/drawingml/2006/main" xmlns:r="http://schemas.openxmlformats.org/officeDocument/2006/relationships" xmlns:p="http://schemas.openxmlformats.org/presentationml/2006/main">
+  <p:cSld>
+    <p:spTree>
+      <p:nvGrpSpPr>
+        <p:cNvPr id="1" name=""/>
+        <p:cNvGrpSpPr/>
+        <p:nvPr/>
+      </p:nvGrpSpPr>
+      <p:grpSpPr>
+        <a:xfrm>
+          <a:off x="0" y="0"/>
+          <a:ext cx="0" cy="0"/>
+          <a:chOff x="0" y="0"/>
+          <a:chExt cx="0" cy="0"/>
+        </a:xfrm>
+      </p:grpSpPr>
+      <p:sp>
+        <p:nvSpPr>
+          <p:cNvPr id="2" name="Title 1">
+            <a:extLst>
+              <a:ext uri="{FF2B5EF4-FFF2-40B4-BE49-F238E27FC236}">
+                <a16:creationId xmlns:a16="http://schemas.microsoft.com/office/drawing/2014/main" id="{6D804DAD-F4D2-EB48-9443-47E91A94D708}"/>
+              </a:ext>
+            </a:extLst>
+          </p:cNvPr>
+          <p:cNvSpPr>
+            <a:spLocks noGrp="1"/>
+          </p:cNvSpPr>
+          <p:nvPr>
+            <p:ph type="title"/>
+          </p:nvPr>
+        </p:nvSpPr>
+        <p:spPr>
+          <a:xfrm>
+            <a:off x="838200" y="0"/>
+            <a:ext cx="10515600" cy="6241009"/>
+          </a:xfrm>
+        </p:spPr>
+        <p:txBody>
+          <a:bodyPr>
+            <a:noAutofit/>
+          </a:bodyPr>
+          <a:lstStyle/>
+          <a:p>
+            <a:r>
+              <a:rPr lang="en-US" sz="1200" dirty="0"/>
+              <a:t>("Mathematical Concepts"[Mesh] OR "Operations Research"[Mesh] OR "operations research" OR "operational research")</a:t>
+            </a:r>
+            <a:br>
+              <a:rPr lang="en-US" sz="1200" dirty="0"/>
+            </a:br>
+            <a:r>
+              <a:rPr lang="en-US" sz="1200" dirty="0"/>
+              <a:t>AND</a:t>
+            </a:r>
+            <a:br>
+              <a:rPr lang="en-US" sz="1200" dirty="0"/>
+            </a:br>
+            <a:r>
+              <a:rPr lang="en-US" sz="1200" dirty="0"/>
+              <a:t>("Radiotherapy"[Mesh] OR "radiotherapy" OR "radiation therapy")</a:t>
+            </a:r>
+            <a:br>
+              <a:rPr lang="en-US" sz="1200" dirty="0"/>
+            </a:br>
+            <a:r>
+              <a:rPr lang="en-US" sz="1200" dirty="0"/>
+              <a:t>AND</a:t>
+            </a:r>
+            <a:br>
+              <a:rPr lang="en-US" sz="1200" dirty="0"/>
+            </a:br>
+            <a:r>
+              <a:rPr lang="en-US" sz="1200" dirty="0"/>
+              <a:t>("Clinical Decision-Making"[Mesh] OR "Decision Support Techniques"[Mesh] OR "Decision Support Systems, Clinical"[Mesh] OR</a:t>
+            </a:r>
+            <a:br>
+              <a:rPr lang="en-US" sz="1200" dirty="0"/>
+            </a:br>
+            <a:r>
+              <a:rPr lang="en-US" sz="1200" dirty="0"/>
+              <a:t>"Decision Making"[Mesh] OR "Decision Theory"[Mesh] OR "Clinical Decision Rules"[Mesh] OR "Decision Trees"[Mesh] OR</a:t>
+            </a:r>
+            <a:br>
+              <a:rPr lang="en-US" sz="1200" dirty="0"/>
+            </a:br>
+            <a:r>
+              <a:rPr lang="en-US" sz="1200" dirty="0"/>
+              <a:t>"decision")</a:t>
+            </a:r>
+            <a:br>
+              <a:rPr lang="en-US" sz="1200" dirty="0"/>
+            </a:br>
+            <a:br>
+              <a:rPr lang="en-US" sz="1200" dirty="0"/>
+            </a:br>
+            <a:endParaRPr lang="en-US" sz="1200" dirty="0"/>
+          </a:p>
+        </p:txBody>
+      </p:sp>
+      <p:sp>
+        <p:nvSpPr>
+          <p:cNvPr id="3" name="Content Placeholder 2">
+            <a:extLst>
+              <a:ext uri="{FF2B5EF4-FFF2-40B4-BE49-F238E27FC236}">
+                <a16:creationId xmlns:a16="http://schemas.microsoft.com/office/drawing/2014/main" id="{43BB1DA0-5C2C-3D42-9701-B21381A6ECC9}"/>
+              </a:ext>
+            </a:extLst>
+          </p:cNvPr>
+          <p:cNvSpPr>
+            <a:spLocks noGrp="1"/>
+          </p:cNvSpPr>
+          <p:nvPr>
+            <p:ph idx="1"/>
+          </p:nvPr>
+        </p:nvSpPr>
+        <p:spPr>
+          <a:xfrm>
+            <a:off x="838200" y="6241009"/>
+            <a:ext cx="10515600" cy="616991"/>
+          </a:xfrm>
+        </p:spPr>
+        <p:txBody>
+          <a:bodyPr/>
+          <a:lstStyle/>
+          <a:p>
+            <a:pPr marL="0" indent="0" algn="ctr">
+              <a:buNone/>
+            </a:pPr>
+            <a:r>
+              <a:rPr lang="en-US" dirty="0"/>
+              <a:t>N = 2,225</a:t>
+            </a:r>
+          </a:p>
+        </p:txBody>
+      </p:sp>
+    </p:spTree>
+    <p:extLst>
+      <p:ext uri="{BB962C8B-B14F-4D97-AF65-F5344CB8AC3E}">
+        <p14:creationId xmlns:p14="http://schemas.microsoft.com/office/powerpoint/2010/main" val="1861579595"/>
+      </p:ext>
+    </p:extLst>
+  </p:cSld>
+  <p:clrMapOvr>
+    <a:masterClrMapping/>
+  </p:clrMapOvr>
+</p:sld>
+</file>
+
+<file path=ppt/slides/slide3.xml><?xml version="1.0" encoding="utf-8"?>
+<p:sld xmlns:a="http://schemas.openxmlformats.org/drawingml/2006/main" xmlns:r="http://schemas.openxmlformats.org/officeDocument/2006/relationships" xmlns:p="http://schemas.openxmlformats.org/presentationml/2006/main">
+  <p:cSld>
+    <p:spTree>
+      <p:nvGrpSpPr>
+        <p:cNvPr id="1" name=""/>
+        <p:cNvGrpSpPr/>
+        <p:nvPr/>
+      </p:nvGrpSpPr>
+      <p:grpSpPr>
+        <a:xfrm>
+          <a:off x="0" y="0"/>
+          <a:ext cx="0" cy="0"/>
+          <a:chOff x="0" y="0"/>
+          <a:chExt cx="0" cy="0"/>
+        </a:xfrm>
+      </p:grpSpPr>
+      <p:sp>
+        <p:nvSpPr>
+          <p:cNvPr id="2" name="Title 1">
+            <a:extLst>
+              <a:ext uri="{FF2B5EF4-FFF2-40B4-BE49-F238E27FC236}">
+                <a16:creationId xmlns:a16="http://schemas.microsoft.com/office/drawing/2014/main" id="{6D804DAD-F4D2-EB48-9443-47E91A94D708}"/>
+              </a:ext>
+            </a:extLst>
+          </p:cNvPr>
+          <p:cNvSpPr>
+            <a:spLocks noGrp="1"/>
+          </p:cNvSpPr>
+          <p:nvPr>
+            <p:ph type="title"/>
+          </p:nvPr>
+        </p:nvSpPr>
+        <p:spPr>
+          <a:xfrm>
+            <a:off x="838200" y="0"/>
+            <a:ext cx="10515600" cy="6241009"/>
+          </a:xfrm>
+        </p:spPr>
+        <p:txBody>
+          <a:bodyPr>
+            <a:noAutofit/>
+          </a:bodyPr>
+          <a:lstStyle/>
+          <a:p>
+            <a:r>
+              <a:rPr lang="en-US" sz="1200" dirty="0"/>
+              <a:t>("Mathematical Concepts"[Mesh] OR "Operations Research"[Mesh] OR "operations research" OR "operational research")</a:t>
+            </a:r>
+            <a:br>
+              <a:rPr lang="en-US" sz="1200" dirty="0"/>
+            </a:br>
+            <a:r>
+              <a:rPr lang="en-US" sz="1200" dirty="0"/>
+              <a:t>AND</a:t>
+            </a:r>
+            <a:br>
+              <a:rPr lang="en-US" sz="1200" dirty="0"/>
+            </a:br>
+            <a:r>
+              <a:rPr lang="en-US" sz="1200" dirty="0"/>
+              <a:t>("Radiotherapy"[Mesh] OR "radiotherapy" OR "radiation therapy")</a:t>
+            </a:r>
+            <a:br>
+              <a:rPr lang="en-US" sz="1200" dirty="0"/>
+            </a:br>
+            <a:r>
+              <a:rPr lang="en-US" sz="1200" dirty="0"/>
+              <a:t>AND</a:t>
+            </a:r>
+            <a:br>
+              <a:rPr lang="en-US" sz="1200" dirty="0"/>
+            </a:br>
+            <a:r>
+              <a:rPr lang="en-US" sz="1200" dirty="0"/>
+              <a:t>("Clinical Decision-Making"[Mesh] OR "Decision Support Techniques"[Mesh] OR "Decision Support Systems, Clinical"[Mesh] OR</a:t>
+            </a:r>
+            <a:br>
+              <a:rPr lang="en-US" sz="1200" dirty="0"/>
+            </a:br>
+            <a:r>
+              <a:rPr lang="en-US" sz="1200" dirty="0"/>
+              <a:t>"Decision Making"[Mesh] OR "Decision Theory"[Mesh] OR "Clinical Decision Rules"[Mesh] OR "Decision Trees"[Mesh] OR</a:t>
+            </a:r>
+            <a:br>
+              <a:rPr lang="en-US" sz="1200" dirty="0"/>
+            </a:br>
+            <a:r>
+              <a:rPr lang="en-US" sz="1200" dirty="0"/>
+              <a:t>"decision")</a:t>
+            </a:r>
+            <a:br>
+              <a:rPr lang="en-US" sz="1200" dirty="0"/>
+            </a:br>
+            <a:r>
+              <a:rPr lang="en-US" sz="1200" dirty="0"/>
+              <a:t>NOT "Anisotropy"[Mesh]</a:t>
+            </a:r>
+            <a:br>
+              <a:rPr lang="en-US" sz="1200" dirty="0"/>
+            </a:br>
+            <a:r>
+              <a:rPr lang="en-US" sz="1200" dirty="0"/>
+              <a:t>NOT "Artificial Intelligence"[Mesh]</a:t>
+            </a:r>
+            <a:br>
+              <a:rPr lang="en-US" sz="1200" dirty="0"/>
+            </a:br>
+            <a:r>
+              <a:rPr lang="en-US" sz="1200" dirty="0"/>
+              <a:t>NOT "Bionics"[Mesh]</a:t>
+            </a:r>
+            <a:br>
+              <a:rPr lang="en-US" sz="1200" dirty="0"/>
+            </a:br>
+            <a:r>
+              <a:rPr lang="en-US" sz="1200" dirty="0"/>
+              <a:t>NOT "Cells, Cultured"[Mesh]</a:t>
+            </a:r>
+            <a:br>
+              <a:rPr lang="en-US" sz="1200" dirty="0"/>
+            </a:br>
+            <a:r>
+              <a:rPr lang="en-US" sz="1200" dirty="0"/>
+              <a:t>NOT "Clinical Trial"[Publication Type]</a:t>
+            </a:r>
+            <a:br>
+              <a:rPr lang="en-US" sz="1200" dirty="0"/>
+            </a:br>
+            <a:r>
+              <a:rPr lang="en-US" sz="1200" dirty="0"/>
+              <a:t>NOT "Cryopreservation"[Mesh]</a:t>
+            </a:r>
+            <a:br>
+              <a:rPr lang="en-US" sz="1200" dirty="0"/>
+            </a:br>
+            <a:r>
+              <a:rPr lang="en-US" sz="1200" dirty="0"/>
+              <a:t>NOT "Diagnosis, Differential"[Mesh]</a:t>
+            </a:r>
+            <a:br>
+              <a:rPr lang="en-US" sz="1200" dirty="0"/>
+            </a:br>
+            <a:r>
+              <a:rPr lang="en-US" sz="1200" dirty="0"/>
+              <a:t>NOT "Disaster Planning"[Mesh]</a:t>
+            </a:r>
+            <a:br>
+              <a:rPr lang="en-US" sz="1200" dirty="0"/>
+            </a:br>
+            <a:r>
+              <a:rPr lang="en-US" sz="1200" dirty="0"/>
+              <a:t>NOT "DNA"[Mesh]</a:t>
+            </a:r>
+            <a:br>
+              <a:rPr lang="en-US" sz="1200" dirty="0"/>
+            </a:br>
+            <a:r>
+              <a:rPr lang="en-US" sz="1200" dirty="0"/>
+              <a:t>NOT "Legal Case"[Publication Type]</a:t>
+            </a:r>
+            <a:br>
+              <a:rPr lang="en-US" sz="1200" dirty="0"/>
+            </a:br>
+            <a:r>
+              <a:rPr lang="en-US" sz="1200" dirty="0"/>
+              <a:t>NOT "Machine Learning"[Mesh]</a:t>
+            </a:r>
+            <a:br>
+              <a:rPr lang="en-US" sz="1200" dirty="0"/>
+            </a:br>
+            <a:r>
+              <a:rPr lang="en-US" sz="1200" dirty="0"/>
+              <a:t>NOT "Meta-Analysis" [Publication Type]</a:t>
+            </a:r>
+            <a:br>
+              <a:rPr lang="en-US" sz="1200" dirty="0"/>
+            </a:br>
+            <a:r>
+              <a:rPr lang="en-US" sz="1200" dirty="0"/>
+              <a:t>NOT "Observational Study"[Publication Type]</a:t>
+            </a:r>
+            <a:br>
+              <a:rPr lang="en-US" sz="1200" dirty="0"/>
+            </a:br>
+            <a:r>
+              <a:rPr lang="en-US" sz="1200" dirty="0"/>
+              <a:t>NOT "Patient Positioning"[Mesh]</a:t>
+            </a:r>
+            <a:br>
+              <a:rPr lang="en-US" sz="1200" dirty="0"/>
+            </a:br>
+            <a:r>
+              <a:rPr lang="en-US" sz="1200" dirty="0"/>
+              <a:t>NOT "Prognosis"[Mesh]</a:t>
+            </a:r>
+            <a:br>
+              <a:rPr lang="en-US" sz="1200" dirty="0"/>
+            </a:br>
+            <a:r>
+              <a:rPr lang="en-US" sz="1200" dirty="0"/>
+              <a:t>NOT "Phantoms, Imaging"[Mesh]</a:t>
+            </a:r>
+            <a:br>
+              <a:rPr lang="en-US" sz="1200" dirty="0"/>
+            </a:br>
+            <a:r>
+              <a:rPr lang="en-US" sz="1200" dirty="0"/>
+              <a:t>NOT "Radiation Protection"[Mesh]</a:t>
+            </a:r>
+            <a:br>
+              <a:rPr lang="en-US" sz="1200" dirty="0"/>
+            </a:br>
+            <a:r>
+              <a:rPr lang="en-US" sz="1200" dirty="0"/>
+              <a:t>NOT "Radiology, Interventional"[Mesh]</a:t>
+            </a:r>
+            <a:br>
+              <a:rPr lang="en-US" sz="1200" dirty="0"/>
+            </a:br>
+            <a:r>
+              <a:rPr lang="en-US" sz="1200" dirty="0"/>
+              <a:t>NOT "Radiometry"[Mesh]</a:t>
+            </a:r>
+            <a:br>
+              <a:rPr lang="en-US" sz="1200" dirty="0"/>
+            </a:br>
+            <a:r>
+              <a:rPr lang="en-US" sz="1200" dirty="0"/>
+              <a:t>NOT "Radiotherapy Planning, Computer-Assisted"[Mesh]</a:t>
+            </a:r>
+            <a:br>
+              <a:rPr lang="en-US" sz="1200" dirty="0"/>
+            </a:br>
+            <a:r>
+              <a:rPr lang="en-US" sz="1200" dirty="0"/>
+              <a:t>NOT "Radiotherapy Setup Errors"[Mesh]</a:t>
+            </a:r>
+            <a:br>
+              <a:rPr lang="en-US" sz="1200" dirty="0"/>
+            </a:br>
+            <a:r>
+              <a:rPr lang="en-US" sz="1200" dirty="0"/>
+              <a:t>NOT "Retrospective Studies"[Mesh]</a:t>
+            </a:r>
+            <a:br>
+              <a:rPr lang="en-US" sz="1200" dirty="0"/>
+            </a:br>
+            <a:r>
+              <a:rPr lang="en-US" sz="1200" dirty="0"/>
+              <a:t>NOT "Software"[Mesh]</a:t>
+            </a:r>
+            <a:br>
+              <a:rPr lang="en-US" sz="1200" dirty="0"/>
+            </a:br>
+            <a:r>
+              <a:rPr lang="en-US" sz="1200" dirty="0"/>
+              <a:t>NOT "Survival Analysis"[Mesh]</a:t>
+            </a:r>
+            <a:br>
+              <a:rPr lang="en-US" sz="1200" dirty="0"/>
+            </a:br>
+            <a:r>
+              <a:rPr lang="en-US" sz="1200" dirty="0"/>
+              <a:t>NOT "Quality Assurance, Health Care"[Mesh]</a:t>
+            </a:r>
+            <a:br>
+              <a:rPr lang="en-US" sz="1200" dirty="0"/>
+            </a:br>
+            <a:r>
+              <a:rPr lang="en-US" sz="1200" dirty="0"/>
+              <a:t>NOT "Quality Control"[Mesh]</a:t>
+            </a:r>
+            <a:br>
+              <a:rPr lang="en-US" sz="1200" dirty="0"/>
+            </a:br>
+            <a:r>
+              <a:rPr lang="en-US" sz="1200" dirty="0"/>
+              <a:t>NOT "Uncertainty"[Mesh]</a:t>
+            </a:r>
+          </a:p>
+        </p:txBody>
+      </p:sp>
+      <p:sp>
+        <p:nvSpPr>
+          <p:cNvPr id="3" name="Content Placeholder 2">
+            <a:extLst>
+              <a:ext uri="{FF2B5EF4-FFF2-40B4-BE49-F238E27FC236}">
+                <a16:creationId xmlns:a16="http://schemas.microsoft.com/office/drawing/2014/main" id="{43BB1DA0-5C2C-3D42-9701-B21381A6ECC9}"/>
+              </a:ext>
+            </a:extLst>
+          </p:cNvPr>
+          <p:cNvSpPr>
+            <a:spLocks noGrp="1"/>
+          </p:cNvSpPr>
+          <p:nvPr>
+            <p:ph idx="1"/>
+          </p:nvPr>
+        </p:nvSpPr>
+        <p:spPr>
+          <a:xfrm>
+            <a:off x="838200" y="6241009"/>
+            <a:ext cx="10515600" cy="616991"/>
+          </a:xfrm>
+        </p:spPr>
+        <p:txBody>
+          <a:bodyPr/>
+          <a:lstStyle/>
+          <a:p>
+            <a:pPr marL="0" indent="0" algn="ctr">
+              <a:buNone/>
+            </a:pPr>
+            <a:r>
+              <a:rPr lang="en-US" dirty="0"/>
+              <a:t>N = 287</a:t>
+            </a:r>
+          </a:p>
+        </p:txBody>
+      </p:sp>
+    </p:spTree>
+    <p:extLst>
+      <p:ext uri="{BB962C8B-B14F-4D97-AF65-F5344CB8AC3E}">
+        <p14:creationId xmlns:p14="http://schemas.microsoft.com/office/powerpoint/2010/main" val="1777122621"/>
+      </p:ext>
+    </p:extLst>
+  </p:cSld>
+  <p:clrMapOvr>
+    <a:masterClrMapping/>
+  </p:clrMapOvr>
+</p:sld>
+</file>
+
+<file path=ppt/slides/slide4.xml><?xml version="1.0" encoding="utf-8"?>
+<p:sld xmlns:a="http://schemas.openxmlformats.org/drawingml/2006/main" xmlns:r="http://schemas.openxmlformats.org/officeDocument/2006/relationships" xmlns:p="http://schemas.openxmlformats.org/presentationml/2006/main">
+  <p:cSld>
+    <p:spTree>
+      <p:nvGrpSpPr>
+        <p:cNvPr id="1" name=""/>
+        <p:cNvGrpSpPr/>
+        <p:nvPr/>
+      </p:nvGrpSpPr>
+      <p:grpSpPr>
+        <a:xfrm>
+          <a:off x="0" y="0"/>
+          <a:ext cx="0" cy="0"/>
+          <a:chOff x="0" y="0"/>
+          <a:chExt cx="0" cy="0"/>
+        </a:xfrm>
+      </p:grpSpPr>
+      <p:sp>
+        <p:nvSpPr>
+          <p:cNvPr id="2" name="Title 1">
+            <a:extLst>
+              <a:ext uri="{FF2B5EF4-FFF2-40B4-BE49-F238E27FC236}">
+                <a16:creationId xmlns:a16="http://schemas.microsoft.com/office/drawing/2014/main" id="{6D804DAD-F4D2-EB48-9443-47E91A94D708}"/>
+              </a:ext>
+            </a:extLst>
+          </p:cNvPr>
+          <p:cNvSpPr>
+            <a:spLocks noGrp="1"/>
+          </p:cNvSpPr>
+          <p:nvPr>
+            <p:ph type="title"/>
+          </p:nvPr>
+        </p:nvSpPr>
+        <p:spPr>
+          <a:xfrm>
+            <a:off x="838200" y="0"/>
+            <a:ext cx="10515600" cy="6241009"/>
+          </a:xfrm>
+        </p:spPr>
+        <p:txBody>
+          <a:bodyPr>
+            <a:noAutofit/>
+          </a:bodyPr>
+          <a:lstStyle/>
+          <a:p>
+            <a:r>
+              <a:rPr lang="en-US" sz="1200" dirty="0"/>
+              <a:t>("Mathematical Concepts"[Mesh] OR "Operations Research"[Mesh] OR "operations research" OR "operational research")</a:t>
+            </a:r>
+            <a:br>
+              <a:rPr lang="en-US" sz="1200" dirty="0"/>
+            </a:br>
+            <a:r>
+              <a:rPr lang="en-US" sz="1200" dirty="0"/>
+              <a:t>AND</a:t>
+            </a:r>
+            <a:br>
+              <a:rPr lang="en-US" sz="1200" dirty="0"/>
+            </a:br>
+            <a:r>
+              <a:rPr lang="en-US" sz="1200" dirty="0"/>
+              <a:t>("Radiotherapy"[Mesh] OR "radiotherapy" OR "radiation therapy")</a:t>
+            </a:r>
+            <a:br>
+              <a:rPr lang="en-US" sz="1200" dirty="0"/>
+            </a:br>
+            <a:r>
+              <a:rPr lang="en-US" sz="1200" dirty="0"/>
+              <a:t>AND</a:t>
+            </a:r>
+            <a:br>
+              <a:rPr lang="en-US" sz="1200" dirty="0"/>
+            </a:br>
+            <a:r>
+              <a:rPr lang="en-US" sz="1200" dirty="0"/>
+              <a:t>("Clinical Decision-Making"[Mesh] OR "Decision Support Techniques"[Mesh] OR "Decision Support Systems, Clinical"[Mesh] OR</a:t>
+            </a:r>
+            <a:br>
+              <a:rPr lang="en-US" sz="1200" dirty="0"/>
+            </a:br>
+            <a:r>
+              <a:rPr lang="en-US" sz="1200" dirty="0"/>
+              <a:t>"Decision Making"[Mesh] OR "Decision Theory"[Mesh] OR "Clinical Decision Rules"[Mesh] OR "Decision Trees"[Mesh] OR</a:t>
+            </a:r>
+            <a:br>
+              <a:rPr lang="en-US" sz="1200" dirty="0"/>
+            </a:br>
+            <a:r>
+              <a:rPr lang="en-US" sz="1200" dirty="0"/>
+              <a:t>"decision")</a:t>
+            </a:r>
+            <a:br>
+              <a:rPr lang="en-US" sz="1200" dirty="0"/>
+            </a:br>
+            <a:r>
+              <a:rPr lang="en-US" sz="1200" dirty="0"/>
+              <a:t>NOT "Anisotropy"[Mesh]</a:t>
+            </a:r>
+            <a:br>
+              <a:rPr lang="en-US" sz="1200" dirty="0"/>
+            </a:br>
+            <a:r>
+              <a:rPr lang="en-US" sz="1200" dirty="0"/>
+              <a:t>NOT "Artificial Intelligence"[Mesh]</a:t>
+            </a:r>
+            <a:br>
+              <a:rPr lang="en-US" sz="1200" dirty="0"/>
+            </a:br>
+            <a:r>
+              <a:rPr lang="en-US" sz="1200" dirty="0"/>
+              <a:t>NOT "Bionics"[Mesh]</a:t>
+            </a:r>
+            <a:br>
+              <a:rPr lang="en-US" sz="1200" dirty="0"/>
+            </a:br>
+            <a:r>
+              <a:rPr lang="en-US" sz="1200" dirty="0"/>
+              <a:t>NOT "Cells, Cultured"[Mesh]</a:t>
+            </a:r>
+            <a:br>
+              <a:rPr lang="en-US" sz="1200" dirty="0"/>
+            </a:br>
+            <a:r>
+              <a:rPr lang="en-US" sz="1200" dirty="0"/>
+              <a:t>NOT "Clinical Trial"[Publication Type]</a:t>
+            </a:r>
+            <a:br>
+              <a:rPr lang="en-US" sz="1200" dirty="0"/>
+            </a:br>
+            <a:r>
+              <a:rPr lang="en-US" sz="1200" dirty="0"/>
+              <a:t>NOT "Cryopreservation"[Mesh]</a:t>
+            </a:r>
+            <a:br>
+              <a:rPr lang="en-US" sz="1200" dirty="0"/>
+            </a:br>
+            <a:r>
+              <a:rPr lang="en-US" sz="1200" dirty="0"/>
+              <a:t>NOT "Diagnosis, Differential"[Mesh]</a:t>
+            </a:r>
+            <a:br>
+              <a:rPr lang="en-US" sz="1200" dirty="0"/>
+            </a:br>
+            <a:r>
+              <a:rPr lang="en-US" sz="1200" dirty="0"/>
+              <a:t>NOT "Disaster Planning"[Mesh]</a:t>
+            </a:r>
+            <a:br>
+              <a:rPr lang="en-US" sz="1200" dirty="0"/>
+            </a:br>
+            <a:r>
+              <a:rPr lang="en-US" sz="1200" dirty="0"/>
+              <a:t>NOT "DNA"[Mesh]</a:t>
+            </a:r>
+            <a:br>
+              <a:rPr lang="en-US" sz="1200" dirty="0"/>
+            </a:br>
+            <a:r>
+              <a:rPr lang="en-US" sz="1200" dirty="0"/>
+              <a:t>NOT "Legal Case"[Publication Type]</a:t>
+            </a:r>
+            <a:br>
+              <a:rPr lang="en-US" sz="1200" dirty="0"/>
+            </a:br>
+            <a:r>
+              <a:rPr lang="en-US" sz="1200" dirty="0"/>
+              <a:t>NOT "Machine Learning"[Mesh]</a:t>
+            </a:r>
+            <a:br>
+              <a:rPr lang="en-US" sz="1200" dirty="0"/>
+            </a:br>
+            <a:r>
+              <a:rPr lang="en-US" sz="1200" dirty="0"/>
+              <a:t>NOT "Meta-Analysis" [Publication Type]</a:t>
+            </a:r>
+            <a:br>
+              <a:rPr lang="en-US" sz="1200" dirty="0"/>
+            </a:br>
+            <a:r>
+              <a:rPr lang="en-US" sz="1200" dirty="0"/>
+              <a:t>NOT "Observational Study"[Publication Type]</a:t>
+            </a:r>
+            <a:br>
+              <a:rPr lang="en-US" sz="1200" dirty="0"/>
+            </a:br>
+            <a:r>
+              <a:rPr lang="en-US" sz="1200" dirty="0"/>
+              <a:t>NOT "Patient Positioning"[Mesh]</a:t>
+            </a:r>
+            <a:br>
+              <a:rPr lang="en-US" sz="1200" dirty="0"/>
+            </a:br>
+            <a:r>
+              <a:rPr lang="en-US" sz="1200" dirty="0"/>
+              <a:t>NOT "Prognosis"[Mesh]</a:t>
+            </a:r>
+            <a:br>
+              <a:rPr lang="en-US" sz="1200" dirty="0"/>
+            </a:br>
+            <a:r>
+              <a:rPr lang="en-US" sz="1200" dirty="0"/>
+              <a:t>NOT "Phantoms, Imaging"[Mesh]</a:t>
+            </a:r>
+            <a:br>
+              <a:rPr lang="en-US" sz="1200" dirty="0"/>
+            </a:br>
+            <a:r>
+              <a:rPr lang="en-US" sz="1200" dirty="0"/>
+              <a:t>NOT "Radiation Protection"[Mesh]</a:t>
+            </a:r>
+            <a:br>
+              <a:rPr lang="en-US" sz="1200" dirty="0"/>
+            </a:br>
+            <a:r>
+              <a:rPr lang="en-US" sz="1200" dirty="0"/>
+              <a:t>NOT "Radiology, Interventional"[Mesh]</a:t>
+            </a:r>
+            <a:br>
+              <a:rPr lang="en-US" sz="1200" dirty="0"/>
+            </a:br>
+            <a:r>
+              <a:rPr lang="en-US" sz="1200" dirty="0"/>
+              <a:t>NOT "Radiometry"[Mesh]</a:t>
+            </a:r>
+            <a:br>
+              <a:rPr lang="en-US" sz="1200" dirty="0"/>
+            </a:br>
+            <a:r>
+              <a:rPr lang="en-US" sz="1200" dirty="0"/>
+              <a:t>NOT "Radiotherapy Planning, Computer-Assisted"[Mesh]</a:t>
+            </a:r>
+            <a:br>
+              <a:rPr lang="en-US" sz="1200" dirty="0"/>
+            </a:br>
+            <a:r>
+              <a:rPr lang="en-US" sz="1200" dirty="0"/>
+              <a:t>NOT "Radiotherapy Setup Errors"[Mesh]</a:t>
+            </a:r>
+            <a:br>
+              <a:rPr lang="en-US" sz="1200" dirty="0"/>
+            </a:br>
+            <a:r>
+              <a:rPr lang="en-US" sz="1200" dirty="0"/>
+              <a:t>NOT "Retrospective Studies"[Mesh]</a:t>
+            </a:r>
+            <a:br>
+              <a:rPr lang="en-US" sz="1200" dirty="0"/>
+            </a:br>
+            <a:r>
+              <a:rPr lang="en-US" sz="1200" dirty="0"/>
+              <a:t>NOT "Software"[Mesh]</a:t>
+            </a:r>
+            <a:br>
+              <a:rPr lang="en-US" sz="1200" dirty="0"/>
+            </a:br>
+            <a:r>
+              <a:rPr lang="en-US" sz="1200" dirty="0"/>
+              <a:t>NOT "Survival Analysis"[Mesh]</a:t>
+            </a:r>
+            <a:br>
+              <a:rPr lang="en-US" sz="1200" dirty="0"/>
+            </a:br>
+            <a:r>
+              <a:rPr lang="en-US" sz="1200" dirty="0"/>
+              <a:t>NOT "Quality Assurance, Health Care"[Mesh]</a:t>
+            </a:r>
+            <a:br>
+              <a:rPr lang="en-US" sz="1200" dirty="0"/>
+            </a:br>
+            <a:r>
+              <a:rPr lang="en-US" sz="1200" dirty="0"/>
+              <a:t>NOT "Quality Control"[Mesh]</a:t>
+            </a:r>
+            <a:br>
+              <a:rPr lang="en-US" sz="1200" dirty="0"/>
+            </a:br>
+            <a:r>
+              <a:rPr lang="en-US" sz="1200" dirty="0"/>
+              <a:t>NOT "Uncertainty"[Mesh]</a:t>
+            </a:r>
+            <a:br>
+              <a:rPr lang="en-US" sz="1200" dirty="0"/>
+            </a:br>
+            <a:r>
+              <a:rPr lang="en-US" sz="1200" dirty="0"/>
+              <a:t>AND "English" [LA]</a:t>
+            </a:r>
+          </a:p>
+        </p:txBody>
+      </p:sp>
+      <p:sp>
+        <p:nvSpPr>
+          <p:cNvPr id="3" name="Content Placeholder 2">
+            <a:extLst>
+              <a:ext uri="{FF2B5EF4-FFF2-40B4-BE49-F238E27FC236}">
+                <a16:creationId xmlns:a16="http://schemas.microsoft.com/office/drawing/2014/main" id="{43BB1DA0-5C2C-3D42-9701-B21381A6ECC9}"/>
+              </a:ext>
+            </a:extLst>
+          </p:cNvPr>
+          <p:cNvSpPr>
+            <a:spLocks noGrp="1"/>
+          </p:cNvSpPr>
+          <p:nvPr>
+            <p:ph idx="1"/>
+          </p:nvPr>
+        </p:nvSpPr>
+        <p:spPr>
+          <a:xfrm>
+            <a:off x="838200" y="6241009"/>
+            <a:ext cx="10515600" cy="616991"/>
+          </a:xfrm>
+        </p:spPr>
+        <p:txBody>
+          <a:bodyPr/>
+          <a:lstStyle/>
+          <a:p>
+            <a:pPr marL="0" indent="0" algn="ctr">
+              <a:buNone/>
+            </a:pPr>
+            <a:r>
+              <a:rPr lang="en-US" dirty="0"/>
+              <a:t>N = 231</a:t>
+            </a:r>
+          </a:p>
+        </p:txBody>
+      </p:sp>
+    </p:spTree>
+    <p:extLst>
+      <p:ext uri="{BB962C8B-B14F-4D97-AF65-F5344CB8AC3E}">
+        <p14:creationId xmlns:p14="http://schemas.microsoft.com/office/powerpoint/2010/main" val="1660134981"/>
+      </p:ext>
+    </p:extLst>
+  </p:cSld>
+  <p:clrMapOvr>
+    <a:masterClrMapping/>
+  </p:clrMapOvr>
+</p:sld>
+</file>
+
+<file path=ppt/slides/slide5.xml><?xml version="1.0" encoding="utf-8"?>
+<p:sld xmlns:a="http://schemas.openxmlformats.org/drawingml/2006/main" xmlns:r="http://schemas.openxmlformats.org/officeDocument/2006/relationships" xmlns:p="http://schemas.openxmlformats.org/presentationml/2006/main">
+  <p:cSld>
+    <p:spTree>
+      <p:nvGrpSpPr>
+        <p:cNvPr id="1" name=""/>
+        <p:cNvGrpSpPr/>
+        <p:nvPr/>
+      </p:nvGrpSpPr>
+      <p:grpSpPr>
+        <a:xfrm>
+          <a:off x="0" y="0"/>
+          <a:ext cx="0" cy="0"/>
+          <a:chOff x="0" y="0"/>
+          <a:chExt cx="0" cy="0"/>
+        </a:xfrm>
+      </p:grpSpPr>
+      <p:sp>
+        <p:nvSpPr>
+          <p:cNvPr id="2" name="Title 1">
+            <a:extLst>
+              <a:ext uri="{FF2B5EF4-FFF2-40B4-BE49-F238E27FC236}">
+                <a16:creationId xmlns:a16="http://schemas.microsoft.com/office/drawing/2014/main" id="{6D804DAD-F4D2-EB48-9443-47E91A94D708}"/>
+              </a:ext>
+            </a:extLst>
+          </p:cNvPr>
+          <p:cNvSpPr>
+            <a:spLocks noGrp="1"/>
+          </p:cNvSpPr>
+          <p:nvPr>
+            <p:ph type="title"/>
+          </p:nvPr>
+        </p:nvSpPr>
+        <p:spPr>
+          <a:xfrm>
+            <a:off x="838200" y="0"/>
+            <a:ext cx="10515600" cy="6241009"/>
+          </a:xfrm>
+        </p:spPr>
+        <p:txBody>
+          <a:bodyPr>
+            <a:noAutofit/>
+          </a:bodyPr>
+          <a:lstStyle/>
+          <a:p>
+            <a:r>
+              <a:rPr lang="en-US" sz="1200" dirty="0"/>
+              <a:t>("Mathematical Concepts"[Mesh] OR "Operations Research"[Mesh] OR "operations research" OR "operational research")</a:t>
+            </a:r>
+            <a:br>
+              <a:rPr lang="en-US" sz="1200" dirty="0"/>
+            </a:br>
+            <a:r>
+              <a:rPr lang="en-US" sz="1200" dirty="0"/>
+              <a:t>AND</a:t>
+            </a:r>
+            <a:br>
+              <a:rPr lang="en-US" sz="1200" dirty="0"/>
+            </a:br>
+            <a:r>
+              <a:rPr lang="en-US" sz="1200" dirty="0"/>
+              <a:t>("Radiotherapy"[Mesh] OR "radiotherapy" OR "radiation therapy")</a:t>
+            </a:r>
+            <a:br>
+              <a:rPr lang="en-US" sz="1200" dirty="0"/>
+            </a:br>
+            <a:r>
+              <a:rPr lang="en-US" sz="1200" dirty="0"/>
+              <a:t>AND</a:t>
+            </a:r>
+            <a:br>
+              <a:rPr lang="en-US" sz="1200" dirty="0"/>
+            </a:br>
+            <a:r>
+              <a:rPr lang="en-US" sz="1200" dirty="0"/>
+              <a:t>("Clinical Decision-Making"[Mesh] OR "Decision Support Techniques"[Mesh] OR "Decision Support Systems, Clinical"[Mesh] OR</a:t>
+            </a:r>
+            <a:br>
+              <a:rPr lang="en-US" sz="1200" dirty="0"/>
+            </a:br>
+            <a:r>
+              <a:rPr lang="en-US" sz="1200" dirty="0"/>
+              <a:t>"Decision Making"[Mesh] OR "Decision Theory"[Mesh] OR "Clinical Decision Rules"[Mesh] OR "Decision Trees"[Mesh] OR</a:t>
+            </a:r>
+            <a:br>
+              <a:rPr lang="en-US" sz="1200" dirty="0"/>
+            </a:br>
+            <a:r>
+              <a:rPr lang="en-US" sz="1200" dirty="0"/>
+              <a:t>"decision")</a:t>
+            </a:r>
+            <a:br>
+              <a:rPr lang="en-US" sz="1200" dirty="0"/>
+            </a:br>
+            <a:r>
+              <a:rPr lang="en-US" sz="1200" dirty="0"/>
+              <a:t>NOT "Anisotropy"[Mesh]</a:t>
+            </a:r>
+            <a:br>
+              <a:rPr lang="en-US" sz="1200" dirty="0"/>
+            </a:br>
+            <a:r>
+              <a:rPr lang="en-US" sz="1200" dirty="0"/>
+              <a:t>NOT "Artificial Intelligence"[Mesh]</a:t>
+            </a:r>
+            <a:br>
+              <a:rPr lang="en-US" sz="1200" dirty="0"/>
+            </a:br>
+            <a:r>
+              <a:rPr lang="en-US" sz="1200" dirty="0"/>
+              <a:t>NOT "Bionics"[Mesh]</a:t>
+            </a:r>
+            <a:br>
+              <a:rPr lang="en-US" sz="1200" dirty="0"/>
+            </a:br>
+            <a:r>
+              <a:rPr lang="en-US" sz="1200" dirty="0"/>
+              <a:t>NOT "Cells, Cultured"[Mesh]</a:t>
+            </a:r>
+            <a:br>
+              <a:rPr lang="en-US" sz="1200" dirty="0"/>
+            </a:br>
+            <a:r>
+              <a:rPr lang="en-US" sz="1200" dirty="0"/>
+              <a:t>NOT "Clinical Trial"[Publication Type]</a:t>
+            </a:r>
+            <a:br>
+              <a:rPr lang="en-US" sz="1200" dirty="0"/>
+            </a:br>
+            <a:r>
+              <a:rPr lang="en-US" sz="1200" dirty="0"/>
+              <a:t>NOT "Cryopreservation"[Mesh]</a:t>
+            </a:r>
+            <a:br>
+              <a:rPr lang="en-US" sz="1200" dirty="0"/>
+            </a:br>
+            <a:r>
+              <a:rPr lang="en-US" sz="1200" dirty="0"/>
+              <a:t>NOT "Diagnosis, Differential"[Mesh]</a:t>
+            </a:r>
+            <a:br>
+              <a:rPr lang="en-US" sz="1200" dirty="0"/>
+            </a:br>
+            <a:r>
+              <a:rPr lang="en-US" sz="1200" dirty="0"/>
+              <a:t>NOT "Disaster Planning"[Mesh]</a:t>
+            </a:r>
+            <a:br>
+              <a:rPr lang="en-US" sz="1200" dirty="0"/>
+            </a:br>
+            <a:r>
+              <a:rPr lang="en-US" sz="1200" dirty="0"/>
+              <a:t>NOT "DNA"[Mesh]</a:t>
+            </a:r>
+            <a:br>
+              <a:rPr lang="en-US" sz="1200" dirty="0"/>
+            </a:br>
+            <a:r>
+              <a:rPr lang="en-US" sz="1200" dirty="0"/>
+              <a:t>NOT "Legal Case"[Publication Type]</a:t>
+            </a:r>
+            <a:br>
+              <a:rPr lang="en-US" sz="1200" dirty="0"/>
+            </a:br>
+            <a:r>
+              <a:rPr lang="en-US" sz="1200" dirty="0"/>
+              <a:t>NOT "Machine Learning"[Mesh]</a:t>
+            </a:r>
+            <a:br>
+              <a:rPr lang="en-US" sz="1200" dirty="0"/>
+            </a:br>
+            <a:r>
+              <a:rPr lang="en-US" sz="1200" dirty="0"/>
+              <a:t>NOT "Meta-Analysis" [Publication Type]</a:t>
+            </a:r>
+            <a:br>
+              <a:rPr lang="en-US" sz="1200" dirty="0"/>
+            </a:br>
+            <a:r>
+              <a:rPr lang="en-US" sz="1200" dirty="0"/>
+              <a:t>NOT "Observational Study"[Publication Type]</a:t>
+            </a:r>
+            <a:br>
+              <a:rPr lang="en-US" sz="1200" dirty="0"/>
+            </a:br>
+            <a:r>
+              <a:rPr lang="en-US" sz="1200" dirty="0"/>
+              <a:t>NOT "Patient Positioning"[Mesh]</a:t>
+            </a:r>
+            <a:br>
+              <a:rPr lang="en-US" sz="1200" dirty="0"/>
+            </a:br>
+            <a:r>
+              <a:rPr lang="en-US" sz="1200" dirty="0"/>
+              <a:t>NOT "Prognosis"[Mesh]</a:t>
+            </a:r>
+            <a:br>
+              <a:rPr lang="en-US" sz="1200" dirty="0"/>
+            </a:br>
+            <a:r>
+              <a:rPr lang="en-US" sz="1200" dirty="0"/>
+              <a:t>NOT "Phantoms, Imaging"[Mesh]</a:t>
+            </a:r>
+            <a:br>
+              <a:rPr lang="en-US" sz="1200" dirty="0"/>
+            </a:br>
+            <a:r>
+              <a:rPr lang="en-US" sz="1200" dirty="0"/>
+              <a:t>NOT "Radiation Protection"[Mesh]</a:t>
+            </a:r>
+            <a:br>
+              <a:rPr lang="en-US" sz="1200" dirty="0"/>
+            </a:br>
+            <a:r>
+              <a:rPr lang="en-US" sz="1200" dirty="0"/>
+              <a:t>NOT "Radiology, Interventional"[Mesh]</a:t>
+            </a:r>
+            <a:br>
+              <a:rPr lang="en-US" sz="1200" dirty="0"/>
+            </a:br>
+            <a:r>
+              <a:rPr lang="en-US" sz="1200" dirty="0"/>
+              <a:t>NOT "Radiometry"[Mesh]</a:t>
+            </a:r>
+            <a:br>
+              <a:rPr lang="en-US" sz="1200" dirty="0"/>
+            </a:br>
+            <a:r>
+              <a:rPr lang="en-US" sz="1200" dirty="0"/>
+              <a:t>NOT "Radiotherapy Planning, Computer-Assisted"[Mesh]</a:t>
+            </a:r>
+            <a:br>
+              <a:rPr lang="en-US" sz="1200" dirty="0"/>
+            </a:br>
+            <a:r>
+              <a:rPr lang="en-US" sz="1200" dirty="0"/>
+              <a:t>NOT "Radiotherapy Setup Errors"[Mesh]</a:t>
+            </a:r>
+            <a:br>
+              <a:rPr lang="en-US" sz="1200" dirty="0"/>
+            </a:br>
+            <a:r>
+              <a:rPr lang="en-US" sz="1200" dirty="0"/>
+              <a:t>NOT "Retrospective Studies"[Mesh]</a:t>
+            </a:r>
+            <a:br>
+              <a:rPr lang="en-US" sz="1200" dirty="0"/>
+            </a:br>
+            <a:r>
+              <a:rPr lang="en-US" sz="1200" dirty="0"/>
+              <a:t>NOT "Software"[Mesh]</a:t>
+            </a:r>
+            <a:br>
+              <a:rPr lang="en-US" sz="1200" dirty="0"/>
+            </a:br>
+            <a:r>
+              <a:rPr lang="en-US" sz="1200" dirty="0"/>
+              <a:t>NOT "Survival Analysis"[Mesh]</a:t>
+            </a:r>
+            <a:br>
+              <a:rPr lang="en-US" sz="1200" dirty="0"/>
+            </a:br>
+            <a:r>
+              <a:rPr lang="en-US" sz="1200" dirty="0"/>
+              <a:t>NOT "Quality Assurance, Health Care"[Mesh]</a:t>
+            </a:r>
+            <a:br>
+              <a:rPr lang="en-US" sz="1200" dirty="0"/>
+            </a:br>
+            <a:r>
+              <a:rPr lang="en-US" sz="1200" dirty="0"/>
+              <a:t>NOT "Quality Control"[Mesh]</a:t>
+            </a:r>
+            <a:br>
+              <a:rPr lang="en-US" sz="1200" dirty="0"/>
+            </a:br>
+            <a:r>
+              <a:rPr lang="en-US" sz="1200" dirty="0"/>
+              <a:t>NOT "Uncertainty"[Mesh]</a:t>
+            </a:r>
+            <a:br>
+              <a:rPr lang="en-US" sz="1200" dirty="0"/>
+            </a:br>
+            <a:r>
+              <a:rPr lang="en-US" sz="1200" dirty="0"/>
+              <a:t>AND "English" [LA]</a:t>
+            </a:r>
+            <a:br>
+              <a:rPr lang="en-US" sz="1200" dirty="0"/>
+            </a:br>
+            <a:r>
+              <a:rPr lang="en-US" sz="1200" dirty="0"/>
+              <a:t>AND 2013:2022[</a:t>
+            </a:r>
+            <a:r>
+              <a:rPr lang="en-US" sz="1200" dirty="0" err="1"/>
+              <a:t>dp</a:t>
+            </a:r>
+            <a:r>
+              <a:rPr lang="en-US" sz="1200" dirty="0"/>
+              <a:t>]</a:t>
+            </a:r>
+          </a:p>
+        </p:txBody>
+      </p:sp>
+      <p:sp>
+        <p:nvSpPr>
+          <p:cNvPr id="3" name="Content Placeholder 2">
+            <a:extLst>
+              <a:ext uri="{FF2B5EF4-FFF2-40B4-BE49-F238E27FC236}">
+                <a16:creationId xmlns:a16="http://schemas.microsoft.com/office/drawing/2014/main" id="{43BB1DA0-5C2C-3D42-9701-B21381A6ECC9}"/>
+              </a:ext>
+            </a:extLst>
+          </p:cNvPr>
+          <p:cNvSpPr>
+            <a:spLocks noGrp="1"/>
+          </p:cNvSpPr>
+          <p:nvPr>
+            <p:ph idx="1"/>
+          </p:nvPr>
+        </p:nvSpPr>
+        <p:spPr>
+          <a:xfrm>
+            <a:off x="838200" y="6241009"/>
+            <a:ext cx="10515600" cy="616991"/>
+          </a:xfrm>
+        </p:spPr>
+        <p:txBody>
+          <a:bodyPr/>
+          <a:lstStyle/>
+          <a:p>
+            <a:pPr marL="0" indent="0" algn="ctr">
+              <a:buNone/>
+            </a:pPr>
+            <a:r>
+              <a:rPr lang="en-US" dirty="0"/>
+              <a:t>N = 107</a:t>
+            </a:r>
+          </a:p>
+        </p:txBody>
+      </p:sp>
+    </p:spTree>
+    <p:extLst>
+      <p:ext uri="{BB962C8B-B14F-4D97-AF65-F5344CB8AC3E}">
+        <p14:creationId xmlns:p14="http://schemas.microsoft.com/office/powerpoint/2010/main" val="225633176"/>
+      </p:ext>
+    </p:extLst>
+  </p:cSld>
+  <p:clrMapOvr>
+    <a:masterClrMapping/>
+  </p:clrMapOvr>
+</p:sld>
+</file>
+
+<file path=ppt/slides/slide6.xml><?xml version="1.0" encoding="utf-8"?>
+<p:sld xmlns:a="http://schemas.openxmlformats.org/drawingml/2006/main" xmlns:r="http://schemas.openxmlformats.org/officeDocument/2006/relationships" xmlns:p="http://schemas.openxmlformats.org/presentationml/2006/main">
+  <p:cSld>
+    <p:spTree>
+      <p:nvGrpSpPr>
+        <p:cNvPr id="1" name=""/>
+        <p:cNvGrpSpPr/>
+        <p:nvPr/>
+      </p:nvGrpSpPr>
+      <p:grpSpPr>
+        <a:xfrm>
+          <a:off x="0" y="0"/>
+          <a:ext cx="0" cy="0"/>
+          <a:chOff x="0" y="0"/>
+          <a:chExt cx="0" cy="0"/>
+        </a:xfrm>
+      </p:grpSpPr>
+      <p:sp>
+        <p:nvSpPr>
+          <p:cNvPr id="2" name="Title 1">
+            <a:extLst>
+              <a:ext uri="{FF2B5EF4-FFF2-40B4-BE49-F238E27FC236}">
+                <a16:creationId xmlns:a16="http://schemas.microsoft.com/office/drawing/2014/main" id="{DB0C6CD3-7EBA-E7B5-8CB6-3D2E2F53AEFB}"/>
+              </a:ext>
+            </a:extLst>
+          </p:cNvPr>
+          <p:cNvSpPr>
+            <a:spLocks noGrp="1"/>
+          </p:cNvSpPr>
+          <p:nvPr>
+            <p:ph type="title"/>
+          </p:nvPr>
+        </p:nvSpPr>
+        <p:spPr>
+          <a:xfrm>
+            <a:off x="838200" y="2766218"/>
+            <a:ext cx="10515600" cy="1325563"/>
+          </a:xfrm>
+        </p:spPr>
+        <p:txBody>
+          <a:bodyPr/>
+          <a:lstStyle/>
+          <a:p>
+            <a:pPr algn="ctr"/>
+            <a:r>
+              <a:rPr lang="en-US" dirty="0"/>
+              <a:t>Latest Queries</a:t>
+            </a:r>
+          </a:p>
+        </p:txBody>
+      </p:sp>
+    </p:spTree>
+    <p:extLst>
+      <p:ext uri="{BB962C8B-B14F-4D97-AF65-F5344CB8AC3E}">
+        <p14:creationId xmlns:p14="http://schemas.microsoft.com/office/powerpoint/2010/main" val="301028681"/>
+      </p:ext>
+    </p:extLst>
+  </p:cSld>
+  <p:clrMapOvr>
+    <a:masterClrMapping/>
+  </p:clrMapOvr>
+</p:sld>
+</file>
+
+<file path=ppt/slides/slide7.xml><?xml version="1.0" encoding="utf-8"?>
+<p:sld xmlns:a="http://schemas.openxmlformats.org/drawingml/2006/main" xmlns:r="http://schemas.openxmlformats.org/officeDocument/2006/relationships" xmlns:p="http://schemas.openxmlformats.org/presentationml/2006/main">
+  <p:cSld>
+    <p:spTree>
+      <p:nvGrpSpPr>
+        <p:cNvPr id="1" name=""/>
+        <p:cNvGrpSpPr/>
+        <p:nvPr/>
+      </p:nvGrpSpPr>
+      <p:grpSpPr>
+        <a:xfrm>
+          <a:off x="0" y="0"/>
+          <a:ext cx="0" cy="0"/>
+          <a:chOff x="0" y="0"/>
+          <a:chExt cx="0" cy="0"/>
+        </a:xfrm>
+      </p:grpSpPr>
+      <p:sp>
+        <p:nvSpPr>
+          <p:cNvPr id="2" name="Title 1">
+            <a:extLst>
+              <a:ext uri="{FF2B5EF4-FFF2-40B4-BE49-F238E27FC236}">
+                <a16:creationId xmlns:a16="http://schemas.microsoft.com/office/drawing/2014/main" id="{6D804DAD-F4D2-EB48-9443-47E91A94D708}"/>
+              </a:ext>
+            </a:extLst>
+          </p:cNvPr>
+          <p:cNvSpPr>
+            <a:spLocks noGrp="1"/>
+          </p:cNvSpPr>
+          <p:nvPr>
+            <p:ph type="title"/>
+          </p:nvPr>
+        </p:nvSpPr>
+        <p:spPr>
+          <a:xfrm>
+            <a:off x="838200" y="0"/>
+            <a:ext cx="10515600" cy="6241009"/>
+          </a:xfrm>
+        </p:spPr>
+        <p:txBody>
+          <a:bodyPr>
+            <a:noAutofit/>
+          </a:bodyPr>
+          <a:lstStyle/>
+          <a:p>
+            <a:r>
+              <a:rPr lang="en-US" sz="1200" dirty="0"/>
+              <a:t>("Stochastic Processes"[Mesh] OR "Operations Research"[Mesh] OR "operations research" OR "operational research" OR "Markov Model" OR "Markov models" OR "Markov chain" OR "Markov chains")</a:t>
+            </a:r>
+            <a:br>
+              <a:rPr lang="en-US" sz="1200" dirty="0"/>
+            </a:br>
+            <a:r>
+              <a:rPr lang="en-US" sz="1200" dirty="0"/>
+              <a:t>AND</a:t>
+            </a:r>
+            <a:br>
+              <a:rPr lang="en-US" sz="1200" dirty="0"/>
+            </a:br>
+            <a:r>
+              <a:rPr lang="en-US" sz="1200" dirty="0"/>
+              <a:t>("Radiotherapy"[Mesh] OR "radiotherapy" OR "radiation therapy")</a:t>
+            </a:r>
+            <a:br>
+              <a:rPr lang="en-US" sz="1200" dirty="0"/>
+            </a:br>
+            <a:r>
+              <a:rPr lang="en-US" sz="1200" dirty="0"/>
+              <a:t>AND</a:t>
+            </a:r>
+            <a:br>
+              <a:rPr lang="en-US" sz="1200" dirty="0"/>
+            </a:br>
+            <a:r>
+              <a:rPr lang="en-US" sz="1200" dirty="0"/>
+              <a:t>("Clinical Decision-Making"[Mesh] OR "Decision Support Techniques"[Mesh] OR "Decision Support Systems, Clinical"[Mesh] OR</a:t>
+            </a:r>
+            <a:br>
+              <a:rPr lang="en-US" sz="1200" dirty="0"/>
+            </a:br>
+            <a:r>
+              <a:rPr lang="en-US" sz="1200" dirty="0"/>
+              <a:t>"Decision Making"[Mesh] OR "Decision Theory"[Mesh] OR "Clinical Decision Rules"[Mesh] OR "Decision Trees"[Mesh] OR</a:t>
+            </a:r>
+            <a:br>
+              <a:rPr lang="en-US" sz="1200" dirty="0"/>
+            </a:br>
+            <a:r>
+              <a:rPr lang="en-US" sz="1200" dirty="0"/>
+              <a:t>"decision")</a:t>
+            </a:r>
+          </a:p>
+        </p:txBody>
+      </p:sp>
+      <p:sp>
+        <p:nvSpPr>
+          <p:cNvPr id="3" name="Content Placeholder 2">
+            <a:extLst>
+              <a:ext uri="{FF2B5EF4-FFF2-40B4-BE49-F238E27FC236}">
+                <a16:creationId xmlns:a16="http://schemas.microsoft.com/office/drawing/2014/main" id="{43BB1DA0-5C2C-3D42-9701-B21381A6ECC9}"/>
+              </a:ext>
+            </a:extLst>
+          </p:cNvPr>
+          <p:cNvSpPr>
+            <a:spLocks noGrp="1"/>
+          </p:cNvSpPr>
+          <p:nvPr>
+            <p:ph idx="1"/>
+          </p:nvPr>
+        </p:nvSpPr>
+        <p:spPr>
+          <a:xfrm>
+            <a:off x="838200" y="6241009"/>
+            <a:ext cx="10515600" cy="616991"/>
+          </a:xfrm>
+        </p:spPr>
+        <p:txBody>
+          <a:bodyPr/>
+          <a:lstStyle/>
+          <a:p>
+            <a:pPr marL="0" indent="0" algn="ctr">
+              <a:buNone/>
+            </a:pPr>
+            <a:r>
+              <a:rPr lang="en-US" dirty="0"/>
+              <a:t>N = 393</a:t>
+            </a:r>
+          </a:p>
+        </p:txBody>
+      </p:sp>
+    </p:spTree>
+    <p:extLst>
+      <p:ext uri="{BB962C8B-B14F-4D97-AF65-F5344CB8AC3E}">
+        <p14:creationId xmlns:p14="http://schemas.microsoft.com/office/powerpoint/2010/main" val="530857258"/>
+      </p:ext>
+    </p:extLst>
+  </p:cSld>
+  <p:clrMapOvr>
+    <a:masterClrMapping/>
+  </p:clrMapOvr>
+</p:sld>
+</file>
+
+<file path=ppt/slides/slide8.xml><?xml version="1.0" encoding="utf-8"?>
+<p:sld xmlns:a="http://schemas.openxmlformats.org/drawingml/2006/main" xmlns:r="http://schemas.openxmlformats.org/officeDocument/2006/relationships" xmlns:p="http://schemas.openxmlformats.org/presentationml/2006/main">
+  <p:cSld>
+    <p:spTree>
+      <p:nvGrpSpPr>
+        <p:cNvPr id="1" name=""/>
+        <p:cNvGrpSpPr/>
+        <p:nvPr/>
+      </p:nvGrpSpPr>
+      <p:grpSpPr>
+        <a:xfrm>
+          <a:off x="0" y="0"/>
+          <a:ext cx="0" cy="0"/>
+          <a:chOff x="0" y="0"/>
+          <a:chExt cx="0" cy="0"/>
+        </a:xfrm>
+      </p:grpSpPr>
+      <p:sp>
+        <p:nvSpPr>
+          <p:cNvPr id="2" name="Title 1">
+            <a:extLst>
+              <a:ext uri="{FF2B5EF4-FFF2-40B4-BE49-F238E27FC236}">
+                <a16:creationId xmlns:a16="http://schemas.microsoft.com/office/drawing/2014/main" id="{6D804DAD-F4D2-EB48-9443-47E91A94D708}"/>
+              </a:ext>
+            </a:extLst>
+          </p:cNvPr>
+          <p:cNvSpPr>
+            <a:spLocks noGrp="1"/>
+          </p:cNvSpPr>
+          <p:nvPr>
+            <p:ph type="title"/>
+          </p:nvPr>
+        </p:nvSpPr>
+        <p:spPr>
+          <a:xfrm>
+            <a:off x="838200" y="0"/>
+            <a:ext cx="10515600" cy="6241009"/>
+          </a:xfrm>
+        </p:spPr>
+        <p:txBody>
+          <a:bodyPr>
+            <a:noAutofit/>
+          </a:bodyPr>
+          <a:lstStyle/>
+          <a:p>
+            <a:r>
+              <a:rPr lang="en-US" sz="1200" dirty="0"/>
+              <a:t>("Stochastic Processes"[Mesh] OR "Operations Research"[Mesh] OR "operations research" OR "operational research" OR "Markov Model" OR "Markov models" OR "Markov chain" OR "Markov chains")</a:t>
+            </a:r>
+            <a:br>
+              <a:rPr lang="en-US" sz="1200" dirty="0"/>
+            </a:br>
+            <a:r>
+              <a:rPr lang="en-US" sz="1200" dirty="0"/>
+              <a:t>AND</a:t>
+            </a:r>
+            <a:br>
+              <a:rPr lang="en-US" sz="1200" dirty="0"/>
+            </a:br>
+            <a:r>
+              <a:rPr lang="en-US" sz="1200" dirty="0"/>
+              <a:t>("Radiotherapy"[Mesh] OR "radiotherapy" OR "radiation therapy")</a:t>
+            </a:r>
+            <a:br>
+              <a:rPr lang="en-US" sz="1200" dirty="0"/>
+            </a:br>
+            <a:r>
+              <a:rPr lang="en-US" sz="1200" dirty="0"/>
+              <a:t>AND</a:t>
+            </a:r>
+            <a:br>
+              <a:rPr lang="en-US" sz="1200" dirty="0"/>
+            </a:br>
+            <a:r>
+              <a:rPr lang="en-US" sz="1200" dirty="0"/>
+              <a:t>("Clinical Decision-Making"[Mesh] OR "Decision Support Techniques"[Mesh] OR "Decision Support Systems, Clinical"[Mesh] OR</a:t>
+            </a:r>
+            <a:br>
+              <a:rPr lang="en-US" sz="1200" dirty="0"/>
+            </a:br>
+            <a:r>
+              <a:rPr lang="en-US" sz="1200" dirty="0"/>
+              <a:t>"Decision Making"[Mesh] OR "Decision Theory"[Mesh] OR "Clinical Decision Rules"[Mesh] OR "Decision Trees"[Mesh] OR</a:t>
+            </a:r>
+            <a:br>
+              <a:rPr lang="en-US" sz="1200" dirty="0"/>
+            </a:br>
+            <a:r>
+              <a:rPr lang="en-US" sz="1200" dirty="0"/>
+              <a:t>"decision")</a:t>
+            </a:r>
+            <a:br>
+              <a:rPr lang="en-US" sz="1200" dirty="0"/>
+            </a:br>
+            <a:r>
+              <a:rPr lang="en-US" sz="1200" dirty="0"/>
+              <a:t>NOT "Anisotropy"[Mesh]</a:t>
+            </a:r>
+            <a:br>
+              <a:rPr lang="en-US" sz="1200" dirty="0"/>
+            </a:br>
+            <a:r>
+              <a:rPr lang="en-US" sz="1200" dirty="0"/>
+              <a:t>NOT "Artificial Intelligence"[Mesh]</a:t>
+            </a:r>
+            <a:br>
+              <a:rPr lang="en-US" sz="1200" dirty="0"/>
+            </a:br>
+            <a:r>
+              <a:rPr lang="en-US" sz="1200" dirty="0"/>
+              <a:t>NOT "Bionics"[Mesh]</a:t>
+            </a:r>
+            <a:br>
+              <a:rPr lang="en-US" sz="1200" dirty="0"/>
+            </a:br>
+            <a:r>
+              <a:rPr lang="en-US" sz="1200" dirty="0"/>
+              <a:t>NOT "Cells, Cultured"[Mesh]</a:t>
+            </a:r>
+            <a:br>
+              <a:rPr lang="en-US" sz="1200" dirty="0"/>
+            </a:br>
+            <a:r>
+              <a:rPr lang="en-US" sz="1200" dirty="0"/>
+              <a:t>NOT "Clinical Trial"[Publication Type]</a:t>
+            </a:r>
+            <a:br>
+              <a:rPr lang="en-US" sz="1200" dirty="0"/>
+            </a:br>
+            <a:r>
+              <a:rPr lang="en-US" sz="1200" dirty="0"/>
+              <a:t>NOT "Cryopreservation"[Mesh]</a:t>
+            </a:r>
+            <a:br>
+              <a:rPr lang="en-US" sz="1200" dirty="0"/>
+            </a:br>
+            <a:r>
+              <a:rPr lang="en-US" sz="1200" dirty="0"/>
+              <a:t>NOT "Diagnosis, Differential"[Mesh]</a:t>
+            </a:r>
+            <a:br>
+              <a:rPr lang="en-US" sz="1200" dirty="0"/>
+            </a:br>
+            <a:r>
+              <a:rPr lang="en-US" sz="1200" dirty="0"/>
+              <a:t>NOT "Disaster Planning"[Mesh]</a:t>
+            </a:r>
+            <a:br>
+              <a:rPr lang="en-US" sz="1200" dirty="0"/>
+            </a:br>
+            <a:r>
+              <a:rPr lang="en-US" sz="1200" dirty="0"/>
+              <a:t>NOT "DNA"[Mesh]</a:t>
+            </a:r>
+            <a:br>
+              <a:rPr lang="en-US" sz="1200" dirty="0"/>
+            </a:br>
+            <a:r>
+              <a:rPr lang="en-US" sz="1200" dirty="0"/>
+              <a:t>NOT "Legal Case"[Publication Type]</a:t>
+            </a:r>
+            <a:br>
+              <a:rPr lang="en-US" sz="1200" dirty="0"/>
+            </a:br>
+            <a:r>
+              <a:rPr lang="en-US" sz="1200" dirty="0"/>
+              <a:t>NOT "Machine Learning"[Mesh]</a:t>
+            </a:r>
+            <a:br>
+              <a:rPr lang="en-US" sz="1200" dirty="0"/>
+            </a:br>
+            <a:r>
+              <a:rPr lang="en-US" sz="1200" dirty="0"/>
+              <a:t>NOT "Meta-Analysis" [Publication Type]</a:t>
+            </a:r>
+            <a:br>
+              <a:rPr lang="en-US" sz="1200" dirty="0"/>
+            </a:br>
+            <a:r>
+              <a:rPr lang="en-US" sz="1200" dirty="0"/>
+              <a:t>NOT "Observational Study"[Publication Type]</a:t>
+            </a:r>
+            <a:br>
+              <a:rPr lang="en-US" sz="1200" dirty="0"/>
+            </a:br>
+            <a:r>
+              <a:rPr lang="en-US" sz="1200" dirty="0"/>
+              <a:t>NOT "Patient Positioning"[Mesh]</a:t>
+            </a:r>
+            <a:br>
+              <a:rPr lang="en-US" sz="1200" dirty="0"/>
+            </a:br>
+            <a:r>
+              <a:rPr lang="en-US" sz="1200" dirty="0"/>
+              <a:t>NOT "Prognosis"[Mesh]</a:t>
+            </a:r>
+            <a:br>
+              <a:rPr lang="en-US" sz="1200" dirty="0"/>
+            </a:br>
+            <a:r>
+              <a:rPr lang="en-US" sz="1200" dirty="0"/>
+              <a:t>NOT "Phantoms, Imaging"[Mesh]</a:t>
+            </a:r>
+            <a:br>
+              <a:rPr lang="en-US" sz="1200" dirty="0"/>
+            </a:br>
+            <a:r>
+              <a:rPr lang="en-US" sz="1200" dirty="0"/>
+              <a:t>NOT "Radiation Protection"[Mesh]</a:t>
+            </a:r>
+            <a:br>
+              <a:rPr lang="en-US" sz="1200" dirty="0"/>
+            </a:br>
+            <a:r>
+              <a:rPr lang="en-US" sz="1200" dirty="0"/>
+              <a:t>NOT "Radiology, Interventional"[Mesh]</a:t>
+            </a:r>
+            <a:br>
+              <a:rPr lang="en-US" sz="1200" dirty="0"/>
+            </a:br>
+            <a:r>
+              <a:rPr lang="en-US" sz="1200" dirty="0"/>
+              <a:t>NOT "Radiometry"[Mesh]</a:t>
+            </a:r>
+            <a:br>
+              <a:rPr lang="en-US" sz="1200" dirty="0"/>
+            </a:br>
+            <a:r>
+              <a:rPr lang="en-US" sz="1200" dirty="0"/>
+              <a:t>NOT "Radiotherapy Planning, Computer-Assisted"[Mesh]</a:t>
+            </a:r>
+            <a:br>
+              <a:rPr lang="en-US" sz="1200" dirty="0"/>
+            </a:br>
+            <a:r>
+              <a:rPr lang="en-US" sz="1200" dirty="0"/>
+              <a:t>NOT "Radiotherapy Setup Errors"[Mesh]</a:t>
+            </a:r>
+            <a:br>
+              <a:rPr lang="en-US" sz="1200" dirty="0"/>
+            </a:br>
+            <a:r>
+              <a:rPr lang="en-US" sz="1200" dirty="0"/>
+              <a:t>NOT "Retrospective Studies"[Mesh]</a:t>
+            </a:r>
+            <a:br>
+              <a:rPr lang="en-US" sz="1200" dirty="0"/>
+            </a:br>
+            <a:r>
+              <a:rPr lang="en-US" sz="1200" dirty="0"/>
+              <a:t>NOT "Software"[Mesh]</a:t>
+            </a:r>
+            <a:br>
+              <a:rPr lang="en-US" sz="1200" dirty="0"/>
+            </a:br>
+            <a:r>
+              <a:rPr lang="en-US" sz="1200" dirty="0"/>
+              <a:t>NOT "Survival Analysis"[Mesh]</a:t>
+            </a:r>
+            <a:br>
+              <a:rPr lang="en-US" sz="1200" dirty="0"/>
+            </a:br>
+            <a:r>
+              <a:rPr lang="en-US" sz="1200" dirty="0"/>
+              <a:t>NOT "Quality Assurance, Health Care"[Mesh]</a:t>
+            </a:r>
+            <a:br>
+              <a:rPr lang="en-US" sz="1200" dirty="0"/>
+            </a:br>
+            <a:r>
+              <a:rPr lang="en-US" sz="1200" dirty="0"/>
+              <a:t>NOT "Quality Control"[Mesh]</a:t>
+            </a:r>
+            <a:br>
+              <a:rPr lang="en-US" sz="1200" dirty="0"/>
+            </a:br>
+            <a:r>
+              <a:rPr lang="en-US" sz="1200" dirty="0"/>
+              <a:t>NOT "Uncertainty"[Mesh]</a:t>
+            </a:r>
+          </a:p>
+        </p:txBody>
+      </p:sp>
+      <p:sp>
+        <p:nvSpPr>
+          <p:cNvPr id="3" name="Content Placeholder 2">
+            <a:extLst>
+              <a:ext uri="{FF2B5EF4-FFF2-40B4-BE49-F238E27FC236}">
+                <a16:creationId xmlns:a16="http://schemas.microsoft.com/office/drawing/2014/main" id="{43BB1DA0-5C2C-3D42-9701-B21381A6ECC9}"/>
+              </a:ext>
+            </a:extLst>
+          </p:cNvPr>
+          <p:cNvSpPr>
+            <a:spLocks noGrp="1"/>
+          </p:cNvSpPr>
+          <p:nvPr>
+            <p:ph idx="1"/>
+          </p:nvPr>
+        </p:nvSpPr>
+        <p:spPr>
+          <a:xfrm>
+            <a:off x="838200" y="6241009"/>
+            <a:ext cx="10515600" cy="616991"/>
+          </a:xfrm>
+        </p:spPr>
+        <p:txBody>
+          <a:bodyPr/>
+          <a:lstStyle/>
+          <a:p>
+            <a:pPr marL="0" indent="0" algn="ctr">
+              <a:buNone/>
+            </a:pPr>
+            <a:r>
+              <a:rPr lang="en-US" dirty="0"/>
+              <a:t>N = 59</a:t>
+            </a:r>
+          </a:p>
+        </p:txBody>
+      </p:sp>
+    </p:spTree>
+    <p:extLst>
+      <p:ext uri="{BB962C8B-B14F-4D97-AF65-F5344CB8AC3E}">
+        <p14:creationId xmlns:p14="http://schemas.microsoft.com/office/powerpoint/2010/main" val="2647709570"/>
+      </p:ext>
+    </p:extLst>
+  </p:cSld>
+  <p:clrMapOvr>
+    <a:masterClrMapping/>
+  </p:clrMapOvr>
+</p:sld>
+</file>
+
+<file path=ppt/slides/slide9.xml><?xml version="1.0" encoding="utf-8"?>
+<p:sld xmlns:a="http://schemas.openxmlformats.org/drawingml/2006/main" xmlns:r="http://schemas.openxmlformats.org/officeDocument/2006/relationships" xmlns:p="http://schemas.openxmlformats.org/presentationml/2006/main">
+  <p:cSld>
+    <p:spTree>
+      <p:nvGrpSpPr>
+        <p:cNvPr id="1" name=""/>
+        <p:cNvGrpSpPr/>
+        <p:nvPr/>
+      </p:nvGrpSpPr>
+      <p:grpSpPr>
+        <a:xfrm>
+          <a:off x="0" y="0"/>
+          <a:ext cx="0" cy="0"/>
+          <a:chOff x="0" y="0"/>
+          <a:chExt cx="0" cy="0"/>
+        </a:xfrm>
+      </p:grpSpPr>
+      <p:sp>
+        <p:nvSpPr>
+          <p:cNvPr id="2" name="Title 1">
+            <a:extLst>
+              <a:ext uri="{FF2B5EF4-FFF2-40B4-BE49-F238E27FC236}">
+                <a16:creationId xmlns:a16="http://schemas.microsoft.com/office/drawing/2014/main" id="{6D804DAD-F4D2-EB48-9443-47E91A94D708}"/>
+              </a:ext>
+            </a:extLst>
+          </p:cNvPr>
+          <p:cNvSpPr>
+            <a:spLocks noGrp="1"/>
+          </p:cNvSpPr>
+          <p:nvPr>
+            <p:ph type="title"/>
+          </p:nvPr>
+        </p:nvSpPr>
+        <p:spPr>
+          <a:xfrm>
+            <a:off x="838200" y="0"/>
+            <a:ext cx="10515600" cy="6241009"/>
+          </a:xfrm>
+        </p:spPr>
+        <p:txBody>
+          <a:bodyPr>
+            <a:noAutofit/>
+          </a:bodyPr>
+          <a:lstStyle/>
+          <a:p>
+            <a:r>
+              <a:rPr lang="en-US" sz="1200" dirty="0"/>
+              <a:t>("Stochastic Processes"[Mesh] OR "Operations Research"[Mesh] OR "operations research" OR "operational research" OR "Markov Model" OR "Markov models" OR "Markov chain" OR "Markov chains")</a:t>
+            </a:r>
+            <a:br>
+              <a:rPr lang="en-US" sz="1200" dirty="0"/>
+            </a:br>
+            <a:r>
+              <a:rPr lang="en-US" sz="1200" dirty="0"/>
+              <a:t>AND</a:t>
+            </a:r>
+            <a:br>
+              <a:rPr lang="en-US" sz="1200" dirty="0"/>
+            </a:br>
+            <a:r>
+              <a:rPr lang="en-US" sz="1200" dirty="0"/>
+              <a:t>("Radiotherapy"[Mesh] OR "radiotherapy" OR "radiation therapy")</a:t>
+            </a:r>
+            <a:br>
+              <a:rPr lang="en-US" sz="1200" dirty="0"/>
+            </a:br>
+            <a:r>
+              <a:rPr lang="en-US" sz="1200" dirty="0"/>
+              <a:t>AND</a:t>
+            </a:r>
+            <a:br>
+              <a:rPr lang="en-US" sz="1200" dirty="0"/>
+            </a:br>
+            <a:r>
+              <a:rPr lang="en-US" sz="1200" dirty="0"/>
+              <a:t>("Clinical Decision-Making"[Mesh] OR "Decision Support Techniques"[Mesh] OR "Decision Support Systems, Clinical"[Mesh] OR</a:t>
+            </a:r>
+            <a:br>
+              <a:rPr lang="en-US" sz="1200" dirty="0"/>
+            </a:br>
+            <a:r>
+              <a:rPr lang="en-US" sz="1200" dirty="0"/>
+              <a:t>"Decision Making"[Mesh] OR "Decision Theory"[Mesh] OR "Clinical Decision Rules"[Mesh] OR "Decision Trees"[Mesh] OR</a:t>
+            </a:r>
+            <a:br>
+              <a:rPr lang="en-US" sz="1200" dirty="0"/>
+            </a:br>
+            <a:r>
+              <a:rPr lang="en-US" sz="1200" dirty="0"/>
+              <a:t>"decision")</a:t>
+            </a:r>
+            <a:br>
+              <a:rPr lang="en-US" sz="1200" dirty="0"/>
+            </a:br>
+            <a:r>
+              <a:rPr lang="en-US" sz="1200" dirty="0"/>
+              <a:t>NOT "Anisotropy"[Mesh]</a:t>
+            </a:r>
+            <a:br>
+              <a:rPr lang="en-US" sz="1200" dirty="0"/>
+            </a:br>
+            <a:r>
+              <a:rPr lang="en-US" sz="1200" dirty="0"/>
+              <a:t>NOT "Artificial Intelligence"[Mesh]</a:t>
+            </a:r>
+            <a:br>
+              <a:rPr lang="en-US" sz="1200" dirty="0"/>
+            </a:br>
+            <a:r>
+              <a:rPr lang="en-US" sz="1200" dirty="0"/>
+              <a:t>NOT "Bionics"[Mesh]</a:t>
+            </a:r>
+            <a:br>
+              <a:rPr lang="en-US" sz="1200" dirty="0"/>
+            </a:br>
+            <a:r>
+              <a:rPr lang="en-US" sz="1200" dirty="0"/>
+              <a:t>NOT "Cells, Cultured"[Mesh]</a:t>
+            </a:r>
+            <a:br>
+              <a:rPr lang="en-US" sz="1200" dirty="0"/>
+            </a:br>
+            <a:r>
+              <a:rPr lang="en-US" sz="1200" dirty="0"/>
+              <a:t>NOT "Clinical Trial"[Publication Type]</a:t>
+            </a:r>
+            <a:br>
+              <a:rPr lang="en-US" sz="1200" dirty="0"/>
+            </a:br>
+            <a:r>
+              <a:rPr lang="en-US" sz="1200" dirty="0"/>
+              <a:t>NOT "Cryopreservation"[Mesh]</a:t>
+            </a:r>
+            <a:br>
+              <a:rPr lang="en-US" sz="1200" dirty="0"/>
+            </a:br>
+            <a:r>
+              <a:rPr lang="en-US" sz="1200" dirty="0"/>
+              <a:t>NOT "Diagnosis, Differential"[Mesh]</a:t>
+            </a:r>
+            <a:br>
+              <a:rPr lang="en-US" sz="1200" dirty="0"/>
+            </a:br>
+            <a:r>
+              <a:rPr lang="en-US" sz="1200" dirty="0"/>
+              <a:t>NOT "Disaster Planning"[Mesh]</a:t>
+            </a:r>
+            <a:br>
+              <a:rPr lang="en-US" sz="1200" dirty="0"/>
+            </a:br>
+            <a:r>
+              <a:rPr lang="en-US" sz="1200" dirty="0"/>
+              <a:t>NOT "DNA"[Mesh]</a:t>
+            </a:r>
+            <a:br>
+              <a:rPr lang="en-US" sz="1200" dirty="0"/>
+            </a:br>
+            <a:r>
+              <a:rPr lang="en-US" sz="1200" dirty="0"/>
+              <a:t>NOT "Legal Case"[Publication Type]</a:t>
+            </a:r>
+            <a:br>
+              <a:rPr lang="en-US" sz="1200" dirty="0"/>
+            </a:br>
+            <a:r>
+              <a:rPr lang="en-US" sz="1200" dirty="0"/>
+              <a:t>NOT "Machine Learning"[Mesh]</a:t>
+            </a:r>
+            <a:br>
+              <a:rPr lang="en-US" sz="1200" dirty="0"/>
+            </a:br>
+            <a:r>
+              <a:rPr lang="en-US" sz="1200" dirty="0"/>
+              <a:t>NOT "Meta-Analysis" [Publication Type]</a:t>
+            </a:r>
+            <a:br>
+              <a:rPr lang="en-US" sz="1200" dirty="0"/>
+            </a:br>
+            <a:r>
+              <a:rPr lang="en-US" sz="1200" dirty="0"/>
+              <a:t>NOT "Observational Study"[Publication Type]</a:t>
+            </a:r>
+            <a:br>
+              <a:rPr lang="en-US" sz="1200" dirty="0"/>
+            </a:br>
+            <a:r>
+              <a:rPr lang="en-US" sz="1200" dirty="0"/>
+              <a:t>NOT "Patient Positioning"[Mesh]</a:t>
+            </a:r>
+            <a:br>
+              <a:rPr lang="en-US" sz="1200" dirty="0"/>
+            </a:br>
+            <a:r>
+              <a:rPr lang="en-US" sz="1200" dirty="0"/>
+              <a:t>NOT "Prognosis"[Mesh]</a:t>
+            </a:r>
+            <a:br>
+              <a:rPr lang="en-US" sz="1200" dirty="0"/>
+            </a:br>
+            <a:r>
+              <a:rPr lang="en-US" sz="1200" dirty="0"/>
+              <a:t>NOT "Phantoms, Imaging"[Mesh]</a:t>
+            </a:r>
+            <a:br>
+              <a:rPr lang="en-US" sz="1200" dirty="0"/>
+            </a:br>
+            <a:r>
+              <a:rPr lang="en-US" sz="1200" dirty="0"/>
+              <a:t>NOT "Radiation Protection"[Mesh]</a:t>
+            </a:r>
+            <a:br>
+              <a:rPr lang="en-US" sz="1200" dirty="0"/>
+            </a:br>
+            <a:r>
+              <a:rPr lang="en-US" sz="1200" dirty="0"/>
+              <a:t>NOT "Radiology, Interventional"[Mesh]</a:t>
+            </a:r>
+            <a:br>
+              <a:rPr lang="en-US" sz="1200" dirty="0"/>
+            </a:br>
+            <a:r>
+              <a:rPr lang="en-US" sz="1200" dirty="0"/>
+              <a:t>NOT "Radiometry"[Mesh]</a:t>
+            </a:r>
+            <a:br>
+              <a:rPr lang="en-US" sz="1200" dirty="0"/>
+            </a:br>
+            <a:r>
+              <a:rPr lang="en-US" sz="1200" dirty="0"/>
+              <a:t>NOT "Radiotherapy Planning, Computer-Assisted"[Mesh]</a:t>
+            </a:r>
+            <a:br>
+              <a:rPr lang="en-US" sz="1200" dirty="0"/>
+            </a:br>
+            <a:r>
+              <a:rPr lang="en-US" sz="1200" dirty="0"/>
+              <a:t>NOT "Radiotherapy Setup Errors"[Mesh]</a:t>
+            </a:r>
+            <a:br>
+              <a:rPr lang="en-US" sz="1200" dirty="0"/>
+            </a:br>
+            <a:r>
+              <a:rPr lang="en-US" sz="1200" dirty="0"/>
+              <a:t>NOT "Retrospective Studies"[Mesh]</a:t>
+            </a:r>
+            <a:br>
+              <a:rPr lang="en-US" sz="1200" dirty="0"/>
+            </a:br>
+            <a:r>
+              <a:rPr lang="en-US" sz="1200" dirty="0"/>
+              <a:t>NOT "Software"[Mesh]</a:t>
+            </a:r>
+            <a:br>
+              <a:rPr lang="en-US" sz="1200" dirty="0"/>
+            </a:br>
+            <a:r>
+              <a:rPr lang="en-US" sz="1200" dirty="0"/>
+              <a:t>NOT "Survival Analysis"[Mesh]</a:t>
+            </a:r>
+            <a:br>
+              <a:rPr lang="en-US" sz="1200" dirty="0"/>
+            </a:br>
+            <a:r>
+              <a:rPr lang="en-US" sz="1200" dirty="0"/>
+              <a:t>NOT "Quality Assurance, Health Care"[Mesh]</a:t>
+            </a:r>
+            <a:br>
+              <a:rPr lang="en-US" sz="1200" dirty="0"/>
+            </a:br>
+            <a:r>
+              <a:rPr lang="en-US" sz="1200" dirty="0"/>
+              <a:t>NOT "Quality Control"[Mesh]</a:t>
+            </a:r>
+            <a:br>
+              <a:rPr lang="en-US" sz="1200" dirty="0"/>
+            </a:br>
+            <a:r>
+              <a:rPr lang="en-US" sz="1200" dirty="0"/>
+              <a:t>NOT "Uncertainty"[Mesh]</a:t>
+            </a:r>
+            <a:br>
+              <a:rPr lang="en-US" sz="1200" dirty="0"/>
+            </a:br>
+            <a:r>
+              <a:rPr lang="en-US" sz="1200" dirty="0"/>
+              <a:t>AND "English" [LA]</a:t>
+            </a:r>
+          </a:p>
+        </p:txBody>
+      </p:sp>
+      <p:sp>
+        <p:nvSpPr>
+          <p:cNvPr id="3" name="Content Placeholder 2">
+            <a:extLst>
+              <a:ext uri="{FF2B5EF4-FFF2-40B4-BE49-F238E27FC236}">
+                <a16:creationId xmlns:a16="http://schemas.microsoft.com/office/drawing/2014/main" id="{43BB1DA0-5C2C-3D42-9701-B21381A6ECC9}"/>
+              </a:ext>
+            </a:extLst>
+          </p:cNvPr>
+          <p:cNvSpPr>
+            <a:spLocks noGrp="1"/>
+          </p:cNvSpPr>
+          <p:nvPr>
+            <p:ph idx="1"/>
+          </p:nvPr>
+        </p:nvSpPr>
+        <p:spPr>
+          <a:xfrm>
+            <a:off x="838200" y="6241009"/>
+            <a:ext cx="10515600" cy="616991"/>
+          </a:xfrm>
+        </p:spPr>
+        <p:txBody>
+          <a:bodyPr/>
+          <a:lstStyle/>
+          <a:p>
+            <a:pPr marL="0" indent="0" algn="ctr">
+              <a:buNone/>
+            </a:pPr>
+            <a:r>
+              <a:rPr lang="en-US" dirty="0"/>
+              <a:t>N = 56</a:t>
+            </a:r>
+          </a:p>
+        </p:txBody>
+      </p:sp>
+    </p:spTree>
+    <p:extLst>
+      <p:ext uri="{BB962C8B-B14F-4D97-AF65-F5344CB8AC3E}">
+        <p14:creationId xmlns:p14="http://schemas.microsoft.com/office/powerpoint/2010/main" val="2850143985"/>
       </p:ext>
     </p:extLst>
   </p:cSld>

</xml_diff>